<commit_message>
Started PPTX, finished workshop
</commit_message>
<xml_diff>
--- a/lesson-outliers.pptx
+++ b/lesson-outliers.pptx
@@ -5,14 +5,23 @@
     <p:sldMasterId id="2147483648" r:id="rId4"/>
   </p:sldMasterIdLst>
   <p:notesMasterIdLst>
-    <p:notesMasterId r:id="rId7"/>
+    <p:notesMasterId r:id="rId16"/>
   </p:notesMasterIdLst>
   <p:handoutMasterIdLst>
-    <p:handoutMasterId r:id="rId8"/>
+    <p:handoutMasterId r:id="rId17"/>
   </p:handoutMasterIdLst>
   <p:sldIdLst>
     <p:sldId id="257" r:id="rId5"/>
     <p:sldId id="280" r:id="rId6"/>
+    <p:sldId id="286" r:id="rId7"/>
+    <p:sldId id="281" r:id="rId8"/>
+    <p:sldId id="282" r:id="rId9"/>
+    <p:sldId id="283" r:id="rId10"/>
+    <p:sldId id="284" r:id="rId11"/>
+    <p:sldId id="287" r:id="rId12"/>
+    <p:sldId id="288" r:id="rId13"/>
+    <p:sldId id="289" r:id="rId14"/>
+    <p:sldId id="285" r:id="rId15"/>
   </p:sldIdLst>
   <p:sldSz cx="9144000" cy="6858000" type="screen4x3"/>
   <p:notesSz cx="6858000" cy="9144000"/>
@@ -242,7 +251,7 @@
           <a:p>
             <a:fld id="{1ED7098F-87C7-3046-B8E1-0317C0D8D9C4}" type="datetimeFigureOut">
               <a:rPr lang="en-US" smtClean="0"/>
-              <a:t>9/17/24</a:t>
+              <a:t>10/2/25</a:t>
             </a:fld>
             <a:endParaRPr lang="en-US"/>
           </a:p>
@@ -408,7 +417,7 @@
           <a:p>
             <a:fld id="{A83074A2-D88D-8F43-B619-246CA3905610}" type="datetimeFigureOut">
               <a:rPr lang="en-US" smtClean="0"/>
-              <a:t>9/17/24</a:t>
+              <a:t>10/2/25</a:t>
             </a:fld>
             <a:endParaRPr lang="en-US"/>
           </a:p>
@@ -2213,49 +2222,8 @@
           <a:lstStyle/>
           <a:p>
             <a:r>
-              <a:rPr lang="nl-NL" dirty="0"/>
-              <a:t>TITEL _PRESENTATIE</a:t>
-            </a:r>
-          </a:p>
-        </p:txBody>
-      </p:sp>
-      <p:sp>
-        <p:nvSpPr>
-          <p:cNvPr id="5" name="TextBox 4"/>
-          <p:cNvSpPr txBox="1">
-            <a:spLocks noGrp="1"/>
-          </p:cNvSpPr>
-          <p:nvPr>
-            <p:ph type="body" sz="quarter" idx="11"/>
-          </p:nvPr>
-        </p:nvSpPr>
-        <p:spPr>
-          <a:xfrm>
-            <a:off x="669926" y="5095875"/>
-            <a:ext cx="7839075" cy="276999"/>
-          </a:xfrm>
-          <a:prstGeom prst="rect">
-            <a:avLst/>
-          </a:prstGeom>
-          <a:noFill/>
-        </p:spPr>
-        <p:txBody>
-          <a:bodyPr wrap="square" rtlCol="0">
-            <a:spAutoFit/>
-          </a:bodyPr>
-          <a:lstStyle/>
-          <a:p>
-            <a:pPr>
-              <a:lnSpc>
-                <a:spcPct val="100000"/>
-              </a:lnSpc>
-            </a:pPr>
-            <a:r>
-              <a:rPr lang="nl-NL" altLang="en-US" sz="1200" dirty="0">
-                <a:latin typeface="Arial" panose="020B0604020202020204" pitchFamily="34" charset="0"/>
-                <a:cs typeface="Arial" panose="020B0604020202020204" pitchFamily="34" charset="0"/>
-              </a:rPr>
-              <a:t>Ondertitel indien nodig</a:t>
+              <a:rPr lang="en-US" noProof="0" dirty="0"/>
+              <a:t>_OUTLIERS</a:t>
             </a:r>
           </a:p>
         </p:txBody>
@@ -2276,6 +2244,296 @@
     </mc:Choice>
     <mc:Fallback xmlns="">
       <p:transition spd="slow" advTm="8634"/>
+    </mc:Fallback>
+  </mc:AlternateContent>
+</p:sld>
+</file>
+
+<file path=ppt/slides/slide10.xml><?xml version="1.0" encoding="utf-8"?>
+<p:sld xmlns:a="http://schemas.openxmlformats.org/drawingml/2006/main" xmlns:r="http://schemas.openxmlformats.org/officeDocument/2006/relationships" xmlns:p="http://schemas.openxmlformats.org/presentationml/2006/main">
+  <p:cSld>
+    <p:spTree>
+      <p:nvGrpSpPr>
+        <p:cNvPr id="1" name="">
+          <a:extLst>
+            <a:ext uri="{FF2B5EF4-FFF2-40B4-BE49-F238E27FC236}">
+              <a16:creationId xmlns:a16="http://schemas.microsoft.com/office/drawing/2014/main" id="{0BB094FD-CC7E-DD9D-9810-A254CC769AA1}"/>
+            </a:ext>
+          </a:extLst>
+        </p:cNvPr>
+        <p:cNvGrpSpPr/>
+        <p:nvPr/>
+      </p:nvGrpSpPr>
+      <p:grpSpPr>
+        <a:xfrm>
+          <a:off x="0" y="0"/>
+          <a:ext cx="0" cy="0"/>
+          <a:chOff x="0" y="0"/>
+          <a:chExt cx="0" cy="0"/>
+        </a:xfrm>
+      </p:grpSpPr>
+      <p:sp>
+        <p:nvSpPr>
+          <p:cNvPr id="4" name="Titel 3">
+            <a:extLst>
+              <a:ext uri="{FF2B5EF4-FFF2-40B4-BE49-F238E27FC236}">
+                <a16:creationId xmlns:a16="http://schemas.microsoft.com/office/drawing/2014/main" id="{EB684BA2-FB67-8F58-1A53-7CDD1A5EA859}"/>
+              </a:ext>
+            </a:extLst>
+          </p:cNvPr>
+          <p:cNvSpPr>
+            <a:spLocks noGrp="1"/>
+          </p:cNvSpPr>
+          <p:nvPr>
+            <p:ph type="title"/>
+          </p:nvPr>
+        </p:nvSpPr>
+        <p:spPr/>
+        <p:txBody>
+          <a:bodyPr/>
+          <a:lstStyle/>
+          <a:p>
+            <a:r>
+              <a:rPr lang="en-US" noProof="0" dirty="0"/>
+              <a:t>TITEL SLIDE</a:t>
+            </a:r>
+          </a:p>
+        </p:txBody>
+      </p:sp>
+      <p:sp>
+        <p:nvSpPr>
+          <p:cNvPr id="5" name="Tijdelijke aanduiding voor inhoud 4">
+            <a:extLst>
+              <a:ext uri="{FF2B5EF4-FFF2-40B4-BE49-F238E27FC236}">
+                <a16:creationId xmlns:a16="http://schemas.microsoft.com/office/drawing/2014/main" id="{6C608D39-C09C-C9C6-B5D3-F382243E6AEE}"/>
+              </a:ext>
+            </a:extLst>
+          </p:cNvPr>
+          <p:cNvSpPr>
+            <a:spLocks noGrp="1"/>
+          </p:cNvSpPr>
+          <p:nvPr>
+            <p:ph type="body" sz="quarter" idx="10"/>
+          </p:nvPr>
+        </p:nvSpPr>
+        <p:spPr/>
+        <p:txBody>
+          <a:bodyPr/>
+          <a:lstStyle/>
+          <a:p>
+            <a:pPr marL="342900" indent="-342900">
+              <a:lnSpc>
+                <a:spcPct val="100000"/>
+              </a:lnSpc>
+              <a:buFont typeface="Arial" panose="020B0604020202020204" pitchFamily="34" charset="0"/>
+              <a:buChar char="•"/>
+            </a:pPr>
+            <a:r>
+              <a:rPr lang="en-US" b="1" noProof="0" dirty="0"/>
+              <a:t>Verder </a:t>
+            </a:r>
+            <a:r>
+              <a:rPr lang="en-US" b="1" noProof="0" dirty="0" err="1"/>
+              <a:t>alles</a:t>
+            </a:r>
+            <a:endParaRPr lang="en-US" b="1" noProof="0" dirty="0"/>
+          </a:p>
+          <a:p>
+            <a:pPr marL="342900" indent="-342900">
+              <a:lnSpc>
+                <a:spcPct val="100000"/>
+              </a:lnSpc>
+              <a:buFont typeface="Arial" panose="020B0604020202020204" pitchFamily="34" charset="0"/>
+              <a:buChar char="•"/>
+            </a:pPr>
+            <a:r>
+              <a:rPr lang="en-US" b="1" noProof="0" dirty="0"/>
+              <a:t>In Arial</a:t>
+            </a:r>
+          </a:p>
+          <a:p>
+            <a:pPr marL="342900" indent="-342900">
+              <a:lnSpc>
+                <a:spcPct val="100000"/>
+              </a:lnSpc>
+              <a:buFont typeface="Arial" panose="020B0604020202020204" pitchFamily="34" charset="0"/>
+              <a:buChar char="•"/>
+            </a:pPr>
+            <a:endParaRPr lang="en-US" noProof="0" dirty="0"/>
+          </a:p>
+          <a:p>
+            <a:pPr marL="342900" indent="-342900">
+              <a:lnSpc>
+                <a:spcPct val="100000"/>
+              </a:lnSpc>
+              <a:buFont typeface="Arial" panose="020B0604020202020204" pitchFamily="34" charset="0"/>
+              <a:buChar char="•"/>
+            </a:pPr>
+            <a:endParaRPr lang="en-US" noProof="0" dirty="0"/>
+          </a:p>
+        </p:txBody>
+      </p:sp>
+    </p:spTree>
+    <p:extLst>
+      <p:ext uri="{BB962C8B-B14F-4D97-AF65-F5344CB8AC3E}">
+        <p14:creationId xmlns:p14="http://schemas.microsoft.com/office/powerpoint/2010/main" val="3186070938"/>
+      </p:ext>
+    </p:extLst>
+  </p:cSld>
+  <p:clrMapOvr>
+    <a:masterClrMapping/>
+  </p:clrMapOvr>
+  <mc:AlternateContent xmlns:mc="http://schemas.openxmlformats.org/markup-compatibility/2006">
+    <mc:Choice xmlns:p14="http://schemas.microsoft.com/office/powerpoint/2010/main" Requires="p14">
+      <p:transition spd="slow" p14:dur="2000" advTm="4519"/>
+    </mc:Choice>
+    <mc:Fallback>
+      <p:transition spd="slow" advTm="4519"/>
+    </mc:Fallback>
+  </mc:AlternateContent>
+</p:sld>
+</file>
+
+<file path=ppt/slides/slide11.xml><?xml version="1.0" encoding="utf-8"?>
+<p:sld xmlns:a="http://schemas.openxmlformats.org/drawingml/2006/main" xmlns:r="http://schemas.openxmlformats.org/officeDocument/2006/relationships" xmlns:p="http://schemas.openxmlformats.org/presentationml/2006/main">
+  <p:cSld>
+    <p:spTree>
+      <p:nvGrpSpPr>
+        <p:cNvPr id="1" name="">
+          <a:extLst>
+            <a:ext uri="{FF2B5EF4-FFF2-40B4-BE49-F238E27FC236}">
+              <a16:creationId xmlns:a16="http://schemas.microsoft.com/office/drawing/2014/main" id="{AAAC07A0-AF0D-FE19-3A1A-A6D11058139E}"/>
+            </a:ext>
+          </a:extLst>
+        </p:cNvPr>
+        <p:cNvGrpSpPr/>
+        <p:nvPr/>
+      </p:nvGrpSpPr>
+      <p:grpSpPr>
+        <a:xfrm>
+          <a:off x="0" y="0"/>
+          <a:ext cx="0" cy="0"/>
+          <a:chOff x="0" y="0"/>
+          <a:chExt cx="0" cy="0"/>
+        </a:xfrm>
+      </p:grpSpPr>
+      <p:sp>
+        <p:nvSpPr>
+          <p:cNvPr id="4" name="Titel 3">
+            <a:extLst>
+              <a:ext uri="{FF2B5EF4-FFF2-40B4-BE49-F238E27FC236}">
+                <a16:creationId xmlns:a16="http://schemas.microsoft.com/office/drawing/2014/main" id="{FCD8CC81-32DD-5512-CCF7-14A1A4769690}"/>
+              </a:ext>
+            </a:extLst>
+          </p:cNvPr>
+          <p:cNvSpPr>
+            <a:spLocks noGrp="1"/>
+          </p:cNvSpPr>
+          <p:nvPr>
+            <p:ph type="title"/>
+          </p:nvPr>
+        </p:nvSpPr>
+        <p:spPr/>
+        <p:txBody>
+          <a:bodyPr/>
+          <a:lstStyle/>
+          <a:p>
+            <a:r>
+              <a:rPr lang="en-US" noProof="0" dirty="0"/>
+              <a:t>TITEL SLIDE</a:t>
+            </a:r>
+          </a:p>
+        </p:txBody>
+      </p:sp>
+      <p:sp>
+        <p:nvSpPr>
+          <p:cNvPr id="5" name="Tijdelijke aanduiding voor inhoud 4">
+            <a:extLst>
+              <a:ext uri="{FF2B5EF4-FFF2-40B4-BE49-F238E27FC236}">
+                <a16:creationId xmlns:a16="http://schemas.microsoft.com/office/drawing/2014/main" id="{9CD5D9ED-CAFA-CA66-5B5C-4CB543F81CB9}"/>
+              </a:ext>
+            </a:extLst>
+          </p:cNvPr>
+          <p:cNvSpPr>
+            <a:spLocks noGrp="1"/>
+          </p:cNvSpPr>
+          <p:nvPr>
+            <p:ph type="body" sz="quarter" idx="10"/>
+          </p:nvPr>
+        </p:nvSpPr>
+        <p:spPr/>
+        <p:txBody>
+          <a:bodyPr/>
+          <a:lstStyle/>
+          <a:p>
+            <a:pPr marL="342900" indent="-342900">
+              <a:lnSpc>
+                <a:spcPct val="100000"/>
+              </a:lnSpc>
+              <a:buFont typeface="Arial" panose="020B0604020202020204" pitchFamily="34" charset="0"/>
+              <a:buChar char="•"/>
+            </a:pPr>
+            <a:r>
+              <a:rPr lang="en-US" b="1" noProof="0" dirty="0"/>
+              <a:t>Verder </a:t>
+            </a:r>
+            <a:r>
+              <a:rPr lang="en-US" b="1" noProof="0" dirty="0" err="1"/>
+              <a:t>alles</a:t>
+            </a:r>
+            <a:endParaRPr lang="en-US" b="1" noProof="0" dirty="0"/>
+          </a:p>
+          <a:p>
+            <a:pPr marL="342900" indent="-342900">
+              <a:lnSpc>
+                <a:spcPct val="100000"/>
+              </a:lnSpc>
+              <a:buFont typeface="Arial" panose="020B0604020202020204" pitchFamily="34" charset="0"/>
+              <a:buChar char="•"/>
+            </a:pPr>
+            <a:r>
+              <a:rPr lang="en-US" b="1" noProof="0" dirty="0"/>
+              <a:t>In Arial</a:t>
+            </a:r>
+          </a:p>
+          <a:p>
+            <a:pPr marL="342900" indent="-342900">
+              <a:lnSpc>
+                <a:spcPct val="100000"/>
+              </a:lnSpc>
+              <a:buFont typeface="Arial" panose="020B0604020202020204" pitchFamily="34" charset="0"/>
+              <a:buChar char="•"/>
+            </a:pPr>
+            <a:endParaRPr lang="en-US" noProof="0" dirty="0"/>
+          </a:p>
+          <a:p>
+            <a:pPr marL="342900" indent="-342900">
+              <a:lnSpc>
+                <a:spcPct val="100000"/>
+              </a:lnSpc>
+              <a:buFont typeface="Arial" panose="020B0604020202020204" pitchFamily="34" charset="0"/>
+              <a:buChar char="•"/>
+            </a:pPr>
+            <a:endParaRPr lang="en-US" noProof="0" dirty="0"/>
+          </a:p>
+        </p:txBody>
+      </p:sp>
+    </p:spTree>
+    <p:extLst>
+      <p:ext uri="{BB962C8B-B14F-4D97-AF65-F5344CB8AC3E}">
+        <p14:creationId xmlns:p14="http://schemas.microsoft.com/office/powerpoint/2010/main" val="4056150511"/>
+      </p:ext>
+    </p:extLst>
+  </p:cSld>
+  <p:clrMapOvr>
+    <a:masterClrMapping/>
+  </p:clrMapOvr>
+  <mc:AlternateContent xmlns:mc="http://schemas.openxmlformats.org/markup-compatibility/2006">
+    <mc:Choice xmlns:p14="http://schemas.microsoft.com/office/powerpoint/2010/main" Requires="p14">
+      <p:transition spd="slow" p14:dur="2000" advTm="4519"/>
+    </mc:Choice>
+    <mc:Fallback>
+      <p:transition spd="slow" advTm="4519"/>
     </mc:Fallback>
   </mc:AlternateContent>
 </p:sld>
@@ -2314,10 +2572,9 @@
           <a:lstStyle/>
           <a:p>
             <a:r>
-              <a:rPr lang="nl-NL"/>
-              <a:t>TITEL SLIDE</a:t>
-            </a:r>
-            <a:endParaRPr lang="nl-NL" dirty="0"/>
+              <a:rPr lang="en-US" noProof="0" dirty="0"/>
+              <a:t>LECTURE OVERVIEW</a:t>
+            </a:r>
           </a:p>
         </p:txBody>
       </p:sp>
@@ -2344,8 +2601,8 @@
               <a:buChar char="•"/>
             </a:pPr>
             <a:r>
-              <a:rPr lang="nl-NL" b="1" dirty="0"/>
-              <a:t>Verder alles</a:t>
+              <a:rPr lang="en-US" b="1" noProof="0" dirty="0"/>
+              <a:t>Lesson goals</a:t>
             </a:r>
           </a:p>
           <a:p>
@@ -2357,14 +2614,9 @@
               <a:buChar char="•"/>
             </a:pPr>
             <a:r>
-              <a:rPr lang="nl-NL" b="1" dirty="0"/>
-              <a:t>In </a:t>
-            </a:r>
-            <a:r>
-              <a:rPr lang="nl-NL" b="1" dirty="0" err="1"/>
-              <a:t>Arial</a:t>
-            </a:r>
-            <a:endParaRPr lang="nl-NL" b="1" dirty="0"/>
+              <a:rPr lang="en-US" b="1" noProof="0" dirty="0"/>
+              <a:t>Outliers</a:t>
+            </a:r>
           </a:p>
           <a:p>
             <a:pPr marL="342900" indent="-342900">
@@ -2374,7 +2626,10 @@
               <a:buFont typeface="Arial" panose="020B0604020202020204" pitchFamily="34" charset="0"/>
               <a:buChar char="•"/>
             </a:pPr>
-            <a:endParaRPr lang="nl-NL" dirty="0"/>
+            <a:r>
+              <a:rPr lang="en-US" b="1" noProof="0" dirty="0"/>
+              <a:t>Workshop</a:t>
+            </a:r>
           </a:p>
           <a:p>
             <a:pPr marL="342900" indent="-342900">
@@ -2384,7 +2639,40 @@
               <a:buFont typeface="Arial" panose="020B0604020202020204" pitchFamily="34" charset="0"/>
               <a:buChar char="•"/>
             </a:pPr>
-            <a:endParaRPr lang="nl-NL" dirty="0"/>
+            <a:r>
+              <a:rPr lang="en-US" b="1" noProof="0" dirty="0"/>
+              <a:t>Missing Data</a:t>
+            </a:r>
+          </a:p>
+          <a:p>
+            <a:pPr marL="342900" indent="-342900">
+              <a:lnSpc>
+                <a:spcPct val="100000"/>
+              </a:lnSpc>
+              <a:buFont typeface="Arial" panose="020B0604020202020204" pitchFamily="34" charset="0"/>
+              <a:buChar char="•"/>
+            </a:pPr>
+            <a:endParaRPr lang="en-US" b="1" noProof="0" dirty="0"/>
+          </a:p>
+          <a:p>
+            <a:pPr marL="342900" indent="-342900">
+              <a:lnSpc>
+                <a:spcPct val="100000"/>
+              </a:lnSpc>
+              <a:buFont typeface="Arial" panose="020B0604020202020204" pitchFamily="34" charset="0"/>
+              <a:buChar char="•"/>
+            </a:pPr>
+            <a:endParaRPr lang="en-US" noProof="0" dirty="0"/>
+          </a:p>
+          <a:p>
+            <a:pPr marL="342900" indent="-342900">
+              <a:lnSpc>
+                <a:spcPct val="100000"/>
+              </a:lnSpc>
+              <a:buFont typeface="Arial" panose="020B0604020202020204" pitchFamily="34" charset="0"/>
+              <a:buChar char="•"/>
+            </a:pPr>
+            <a:endParaRPr lang="en-US" noProof="0" dirty="0"/>
           </a:p>
         </p:txBody>
       </p:sp>
@@ -2403,6 +2691,1753 @@
       <p:transition spd="slow" p14:dur="2000" advTm="4519"/>
     </mc:Choice>
     <mc:Fallback xmlns="">
+      <p:transition spd="slow" advTm="4519"/>
+    </mc:Fallback>
+  </mc:AlternateContent>
+</p:sld>
+</file>
+
+<file path=ppt/slides/slide3.xml><?xml version="1.0" encoding="utf-8"?>
+<p:sld xmlns:a="http://schemas.openxmlformats.org/drawingml/2006/main" xmlns:r="http://schemas.openxmlformats.org/officeDocument/2006/relationships" xmlns:p="http://schemas.openxmlformats.org/presentationml/2006/main">
+  <p:cSld>
+    <p:spTree>
+      <p:nvGrpSpPr>
+        <p:cNvPr id="1" name=""/>
+        <p:cNvGrpSpPr/>
+        <p:nvPr/>
+      </p:nvGrpSpPr>
+      <p:grpSpPr>
+        <a:xfrm>
+          <a:off x="0" y="0"/>
+          <a:ext cx="0" cy="0"/>
+          <a:chOff x="0" y="0"/>
+          <a:chExt cx="0" cy="0"/>
+        </a:xfrm>
+      </p:grpSpPr>
+      <p:sp>
+        <p:nvSpPr>
+          <p:cNvPr id="4" name="Titel 3"/>
+          <p:cNvSpPr>
+            <a:spLocks noGrp="1"/>
+          </p:cNvSpPr>
+          <p:nvPr>
+            <p:ph type="title"/>
+          </p:nvPr>
+        </p:nvSpPr>
+        <p:spPr/>
+        <p:txBody>
+          <a:bodyPr/>
+          <a:lstStyle/>
+          <a:p>
+            <a:r>
+              <a:rPr lang="en-US" noProof="0" dirty="0"/>
+              <a:t>LESSON GOALS</a:t>
+            </a:r>
+          </a:p>
+        </p:txBody>
+      </p:sp>
+      <p:sp>
+        <p:nvSpPr>
+          <p:cNvPr id="5" name="Tijdelijke aanduiding voor inhoud 4"/>
+          <p:cNvSpPr>
+            <a:spLocks noGrp="1"/>
+          </p:cNvSpPr>
+          <p:nvPr>
+            <p:ph type="body" sz="quarter" idx="10"/>
+          </p:nvPr>
+        </p:nvSpPr>
+        <p:spPr/>
+        <p:txBody>
+          <a:bodyPr/>
+          <a:lstStyle/>
+          <a:p>
+            <a:pPr marL="342900" indent="-342900">
+              <a:lnSpc>
+                <a:spcPct val="100000"/>
+              </a:lnSpc>
+              <a:buFont typeface="Arial" panose="020B0604020202020204" pitchFamily="34" charset="0"/>
+              <a:buChar char="•"/>
+            </a:pPr>
+            <a:r>
+              <a:rPr lang="en-US" noProof="0" dirty="0"/>
+              <a:t>The student identifies outliers and differentiates between outliers and erroneous data (relates to qualifications: data understanding, data analytics).</a:t>
+            </a:r>
+          </a:p>
+          <a:p>
+            <a:pPr marL="342900" indent="-342900">
+              <a:lnSpc>
+                <a:spcPct val="100000"/>
+              </a:lnSpc>
+              <a:buFont typeface="Arial" panose="020B0604020202020204" pitchFamily="34" charset="0"/>
+              <a:buChar char="•"/>
+            </a:pPr>
+            <a:r>
+              <a:rPr lang="en-US" noProof="0" dirty="0"/>
+              <a:t>The student identifies missing data and interprets its meaning (relates to qualifications: data understanding, data analytics).</a:t>
+            </a:r>
+          </a:p>
+          <a:p>
+            <a:pPr marL="342900" indent="-342900">
+              <a:lnSpc>
+                <a:spcPct val="100000"/>
+              </a:lnSpc>
+              <a:buFont typeface="Arial" panose="020B0604020202020204" pitchFamily="34" charset="0"/>
+              <a:buChar char="•"/>
+            </a:pPr>
+            <a:r>
+              <a:rPr lang="en-US" noProof="0" dirty="0"/>
+              <a:t>The student reflects on what outliers mean in their data (relates to qualifications: data understanding, data analytics).</a:t>
+            </a:r>
+          </a:p>
+          <a:p>
+            <a:pPr marL="342900" indent="-342900">
+              <a:lnSpc>
+                <a:spcPct val="100000"/>
+              </a:lnSpc>
+              <a:buFont typeface="Arial" panose="020B0604020202020204" pitchFamily="34" charset="0"/>
+              <a:buChar char="•"/>
+            </a:pPr>
+            <a:r>
+              <a:rPr lang="en-US" noProof="0" dirty="0"/>
+              <a:t>The student distinguishes between "dirty data" and choosing the wrong distribution model (relates to qualifications: data understanding, data analytics).</a:t>
+            </a:r>
+          </a:p>
+          <a:p>
+            <a:pPr marL="342900" indent="-342900">
+              <a:lnSpc>
+                <a:spcPct val="100000"/>
+              </a:lnSpc>
+              <a:buFont typeface="Arial" panose="020B0604020202020204" pitchFamily="34" charset="0"/>
+              <a:buChar char="•"/>
+            </a:pPr>
+            <a:endParaRPr lang="en-US" noProof="0" dirty="0"/>
+          </a:p>
+        </p:txBody>
+      </p:sp>
+    </p:spTree>
+    <p:extLst>
+      <p:ext uri="{BB962C8B-B14F-4D97-AF65-F5344CB8AC3E}">
+        <p14:creationId xmlns:p14="http://schemas.microsoft.com/office/powerpoint/2010/main" val="2468580276"/>
+      </p:ext>
+    </p:extLst>
+  </p:cSld>
+  <p:clrMapOvr>
+    <a:masterClrMapping/>
+  </p:clrMapOvr>
+  <mc:AlternateContent xmlns:mc="http://schemas.openxmlformats.org/markup-compatibility/2006" xmlns:p14="http://schemas.microsoft.com/office/powerpoint/2010/main">
+    <mc:Choice Requires="p14">
+      <p:transition spd="slow" p14:dur="2000" advTm="4519"/>
+    </mc:Choice>
+    <mc:Fallback xmlns="">
+      <p:transition spd="slow" advTm="4519"/>
+    </mc:Fallback>
+  </mc:AlternateContent>
+</p:sld>
+</file>
+
+<file path=ppt/slides/slide4.xml><?xml version="1.0" encoding="utf-8"?>
+<p:sld xmlns:a="http://schemas.openxmlformats.org/drawingml/2006/main" xmlns:r="http://schemas.openxmlformats.org/officeDocument/2006/relationships" xmlns:p="http://schemas.openxmlformats.org/presentationml/2006/main">
+  <p:cSld>
+    <p:spTree>
+      <p:nvGrpSpPr>
+        <p:cNvPr id="1" name="">
+          <a:extLst>
+            <a:ext uri="{FF2B5EF4-FFF2-40B4-BE49-F238E27FC236}">
+              <a16:creationId xmlns:a16="http://schemas.microsoft.com/office/drawing/2014/main" id="{62668AEC-078F-1B50-ADE0-B707B767E28F}"/>
+            </a:ext>
+          </a:extLst>
+        </p:cNvPr>
+        <p:cNvGrpSpPr/>
+        <p:nvPr/>
+      </p:nvGrpSpPr>
+      <p:grpSpPr>
+        <a:xfrm>
+          <a:off x="0" y="0"/>
+          <a:ext cx="0" cy="0"/>
+          <a:chOff x="0" y="0"/>
+          <a:chExt cx="0" cy="0"/>
+        </a:xfrm>
+      </p:grpSpPr>
+      <p:sp>
+        <p:nvSpPr>
+          <p:cNvPr id="4" name="Titel 3">
+            <a:extLst>
+              <a:ext uri="{FF2B5EF4-FFF2-40B4-BE49-F238E27FC236}">
+                <a16:creationId xmlns:a16="http://schemas.microsoft.com/office/drawing/2014/main" id="{33A331F0-12F3-2654-DB62-212D06FA6299}"/>
+              </a:ext>
+            </a:extLst>
+          </p:cNvPr>
+          <p:cNvSpPr>
+            <a:spLocks noGrp="1"/>
+          </p:cNvSpPr>
+          <p:nvPr>
+            <p:ph type="title"/>
+          </p:nvPr>
+        </p:nvSpPr>
+        <p:spPr/>
+        <p:txBody>
+          <a:bodyPr/>
+          <a:lstStyle/>
+          <a:p>
+            <a:r>
+              <a:rPr lang="en-US" noProof="0" dirty="0"/>
+              <a:t>OUTLIERS (1): WHAT IS AN OUTLIER ANYWAY?</a:t>
+            </a:r>
+          </a:p>
+        </p:txBody>
+      </p:sp>
+      <mc:AlternateContent xmlns:mc="http://schemas.openxmlformats.org/markup-compatibility/2006">
+        <mc:Choice xmlns:a14="http://schemas.microsoft.com/office/drawing/2010/main" Requires="a14">
+          <p:sp>
+            <p:nvSpPr>
+              <p:cNvPr id="5" name="Tijdelijke aanduiding voor inhoud 4">
+                <a:extLst>
+                  <a:ext uri="{FF2B5EF4-FFF2-40B4-BE49-F238E27FC236}">
+                    <a16:creationId xmlns:a16="http://schemas.microsoft.com/office/drawing/2014/main" id="{5D72A3FE-9AFB-0265-0AFA-CD556D7B91CA}"/>
+                  </a:ext>
+                </a:extLst>
+              </p:cNvPr>
+              <p:cNvSpPr>
+                <a:spLocks noGrp="1"/>
+              </p:cNvSpPr>
+              <p:nvPr>
+                <p:ph type="body" sz="quarter" idx="10"/>
+              </p:nvPr>
+            </p:nvSpPr>
+            <p:spPr/>
+            <p:txBody>
+              <a:bodyPr/>
+              <a:lstStyle/>
+              <a:p>
+                <a:pPr marL="342900" indent="-342900">
+                  <a:lnSpc>
+                    <a:spcPct val="100000"/>
+                  </a:lnSpc>
+                  <a:buFont typeface="Arial" panose="020B0604020202020204" pitchFamily="34" charset="0"/>
+                  <a:buChar char="•"/>
+                </a:pPr>
+                <a:r>
+                  <a:rPr lang="en-US" noProof="0" dirty="0"/>
+                  <a:t>What is an outlier anyway?</a:t>
+                </a:r>
+              </a:p>
+              <a:p>
+                <a:pPr marL="342900" indent="-342900">
+                  <a:lnSpc>
+                    <a:spcPct val="100000"/>
+                  </a:lnSpc>
+                  <a:buFont typeface="Arial" panose="020B0604020202020204" pitchFamily="34" charset="0"/>
+                  <a:buChar char="•"/>
+                </a:pPr>
+                <a:r>
+                  <a:rPr lang="en-US" noProof="0" dirty="0"/>
+                  <a:t>Example 1.</a:t>
+                </a:r>
+              </a:p>
+              <a:p>
+                <a:pPr marL="342900" indent="-342900">
+                  <a:lnSpc>
+                    <a:spcPct val="100000"/>
+                  </a:lnSpc>
+                  <a:buFont typeface="Arial" panose="020B0604020202020204" pitchFamily="34" charset="0"/>
+                  <a:buChar char="•"/>
+                </a:pPr>
+                <a:r>
+                  <a:rPr lang="en-US" noProof="0" dirty="0"/>
+                  <a:t>What is an outlier is related to the shape of the distribution.</a:t>
+                </a:r>
+              </a:p>
+              <a:p>
+                <a:pPr marL="342900" indent="-342900">
+                  <a:lnSpc>
+                    <a:spcPct val="100000"/>
+                  </a:lnSpc>
+                  <a:buFont typeface="Arial" panose="020B0604020202020204" pitchFamily="34" charset="0"/>
+                  <a:buChar char="•"/>
+                </a:pPr>
+                <a:r>
+                  <a:rPr lang="en-US" noProof="0" dirty="0"/>
+                  <a:t>Matplotlib boxplots flag values as outliers as follows:</a:t>
+                </a:r>
+              </a:p>
+              <a:p>
+                <a:pPr marL="728653" lvl="1" indent="-342900">
+                  <a:lnSpc>
+                    <a:spcPct val="100000"/>
+                  </a:lnSpc>
+                  <a:buFont typeface="+mj-lt"/>
+                  <a:buAutoNum type="arabicPeriod"/>
+                </a:pPr>
+                <a:r>
+                  <a:rPr lang="en-US" noProof="0" dirty="0"/>
+                  <a:t>Calculate the </a:t>
+                </a:r>
+                <a:r>
+                  <a:rPr lang="en-US" noProof="0" dirty="0" err="1"/>
+                  <a:t>InterQuartile</a:t>
+                </a:r>
+                <a:r>
+                  <a:rPr lang="en-US" noProof="0" dirty="0"/>
+                  <a:t> Range (IQR): Q3 – Q2</a:t>
+                </a:r>
+              </a:p>
+              <a:p>
+                <a:pPr marL="728653" lvl="1" indent="-342900">
+                  <a:lnSpc>
+                    <a:spcPct val="100000"/>
+                  </a:lnSpc>
+                  <a:buFont typeface="+mj-lt"/>
+                  <a:buAutoNum type="arabicPeriod"/>
+                </a:pPr>
+                <a:r>
+                  <a:rPr lang="en-US" noProof="0" dirty="0"/>
+                  <a:t>&gt; Q1 – 1.5 x IQR and &lt; Q3 + 1.5 IQR are outliers (</a:t>
+                </a:r>
+                <a:r>
+                  <a:rPr lang="en-US" noProof="0" dirty="0" err="1"/>
+                  <a:t>ie</a:t>
+                </a:r>
+                <a:r>
+                  <a:rPr lang="en-US" noProof="0" dirty="0"/>
+                  <a:t> the lowest 25% and the highest 25%)</a:t>
+                </a:r>
+              </a:p>
+              <a:p>
+                <a:pPr marL="728653" lvl="1" indent="-342900">
+                  <a:lnSpc>
+                    <a:spcPct val="100000"/>
+                  </a:lnSpc>
+                  <a:buFont typeface="+mj-lt"/>
+                  <a:buAutoNum type="arabicPeriod"/>
+                </a:pPr>
+                <a:endParaRPr lang="en-US" noProof="0" dirty="0"/>
+              </a:p>
+              <a:p>
+                <a:pPr marL="342900" indent="-342900">
+                  <a:lnSpc>
+                    <a:spcPct val="100000"/>
+                  </a:lnSpc>
+                  <a:buFont typeface="Arial" panose="020B0604020202020204" pitchFamily="34" charset="0"/>
+                  <a:buChar char="•"/>
+                </a:pPr>
+                <a:r>
+                  <a:rPr lang="en-US" noProof="0" dirty="0"/>
+                  <a:t>Alternate method: calculate the Z-score:</a:t>
+                </a:r>
+              </a:p>
+              <a:p>
+                <a:pPr marL="728653" lvl="1" indent="-342900">
+                  <a:lnSpc>
+                    <a:spcPct val="100000"/>
+                  </a:lnSpc>
+                </a:pPr>
+                <a14:m>
+                  <m:oMath xmlns:m="http://schemas.openxmlformats.org/officeDocument/2006/math">
+                    <m:r>
+                      <a:rPr lang="nl-NL" b="0" i="1" noProof="0" smtClean="0">
+                        <a:latin typeface="Cambria Math" panose="02040503050406030204" pitchFamily="18" charset="0"/>
+                      </a:rPr>
+                      <m:t>𝑧</m:t>
+                    </m:r>
+                    <m:r>
+                      <a:rPr lang="nl-NL" b="0" i="1" noProof="0" smtClean="0">
+                        <a:latin typeface="Cambria Math" panose="02040503050406030204" pitchFamily="18" charset="0"/>
+                      </a:rPr>
+                      <m:t>=</m:t>
+                    </m:r>
+                    <m:f>
+                      <m:fPr>
+                        <m:ctrlPr>
+                          <a:rPr lang="nl-NL" b="0" i="1" noProof="0" smtClean="0">
+                            <a:latin typeface="Cambria Math" panose="02040503050406030204" pitchFamily="18" charset="0"/>
+                            <a:ea typeface="Cambria Math" panose="02040503050406030204" pitchFamily="18" charset="0"/>
+                          </a:rPr>
+                        </m:ctrlPr>
+                      </m:fPr>
+                      <m:num>
+                        <m:r>
+                          <a:rPr lang="nl-NL" b="0" i="1" noProof="0" smtClean="0">
+                            <a:latin typeface="Cambria Math" panose="02040503050406030204" pitchFamily="18" charset="0"/>
+                            <a:ea typeface="Cambria Math" panose="02040503050406030204" pitchFamily="18" charset="0"/>
+                          </a:rPr>
+                          <m:t>(</m:t>
+                        </m:r>
+                        <m:r>
+                          <a:rPr lang="nl-NL" b="0" i="1" noProof="0" smtClean="0">
+                            <a:latin typeface="Cambria Math" panose="02040503050406030204" pitchFamily="18" charset="0"/>
+                            <a:ea typeface="Cambria Math" panose="02040503050406030204" pitchFamily="18" charset="0"/>
+                          </a:rPr>
+                          <m:t>𝑥</m:t>
+                        </m:r>
+                        <m:r>
+                          <a:rPr lang="nl-NL" b="0" i="1" noProof="0" smtClean="0">
+                            <a:latin typeface="Cambria Math" panose="02040503050406030204" pitchFamily="18" charset="0"/>
+                            <a:ea typeface="Cambria Math" panose="02040503050406030204" pitchFamily="18" charset="0"/>
+                          </a:rPr>
+                          <m:t> − </m:t>
+                        </m:r>
+                        <m:r>
+                          <a:rPr lang="nl-NL" b="0" i="1" noProof="0" smtClean="0">
+                            <a:latin typeface="Cambria Math" panose="02040503050406030204" pitchFamily="18" charset="0"/>
+                            <a:ea typeface="Cambria Math" panose="02040503050406030204" pitchFamily="18" charset="0"/>
+                          </a:rPr>
+                          <m:t>𝜇</m:t>
+                        </m:r>
+                        <m:r>
+                          <a:rPr lang="nl-NL" b="0" i="1" noProof="0" smtClean="0">
+                            <a:latin typeface="Cambria Math" panose="02040503050406030204" pitchFamily="18" charset="0"/>
+                            <a:ea typeface="Cambria Math" panose="02040503050406030204" pitchFamily="18" charset="0"/>
+                          </a:rPr>
+                          <m:t>)</m:t>
+                        </m:r>
+                      </m:num>
+                      <m:den>
+                        <m:r>
+                          <a:rPr lang="nl-NL" b="0" i="1" noProof="0" smtClean="0">
+                            <a:latin typeface="Cambria Math" panose="02040503050406030204" pitchFamily="18" charset="0"/>
+                            <a:ea typeface="Cambria Math" panose="02040503050406030204" pitchFamily="18" charset="0"/>
+                          </a:rPr>
+                          <m:t>𝜎</m:t>
+                        </m:r>
+                      </m:den>
+                    </m:f>
+                  </m:oMath>
+                </a14:m>
+                <a:endParaRPr lang="nl-NL" b="0" noProof="0" dirty="0">
+                  <a:ea typeface="Cambria Math" panose="02040503050406030204" pitchFamily="18" charset="0"/>
+                </a:endParaRPr>
+              </a:p>
+              <a:p>
+                <a:pPr marL="728653" lvl="1" indent="-342900">
+                  <a:lnSpc>
+                    <a:spcPct val="100000"/>
+                  </a:lnSpc>
+                </a:pPr>
+                <a14:m>
+                  <m:oMath xmlns:m="http://schemas.openxmlformats.org/officeDocument/2006/math">
+                    <m:d>
+                      <m:dPr>
+                        <m:begChr m:val="|"/>
+                        <m:endChr m:val="|"/>
+                        <m:ctrlPr>
+                          <a:rPr lang="nl-NL" b="0" i="1" noProof="0" smtClean="0">
+                            <a:latin typeface="Cambria Math" panose="02040503050406030204" pitchFamily="18" charset="0"/>
+                          </a:rPr>
+                        </m:ctrlPr>
+                      </m:dPr>
+                      <m:e>
+                        <m:r>
+                          <a:rPr lang="nl-NL" b="0" i="1" noProof="0" smtClean="0">
+                            <a:latin typeface="Cambria Math" panose="02040503050406030204" pitchFamily="18" charset="0"/>
+                          </a:rPr>
+                          <m:t>𝑧</m:t>
+                        </m:r>
+                      </m:e>
+                    </m:d>
+                    <m:r>
+                      <a:rPr lang="nl-NL" b="0" i="1" noProof="0" smtClean="0">
+                        <a:latin typeface="Cambria Math" panose="02040503050406030204" pitchFamily="18" charset="0"/>
+                      </a:rPr>
+                      <m:t>&gt;3</m:t>
+                    </m:r>
+                  </m:oMath>
+                </a14:m>
+                <a:r>
+                  <a:rPr lang="en-US" noProof="0" dirty="0"/>
+                  <a:t> : outliers</a:t>
+                </a:r>
+              </a:p>
+              <a:p>
+                <a:pPr marL="342900" indent="-342900">
+                  <a:lnSpc>
+                    <a:spcPct val="100000"/>
+                  </a:lnSpc>
+                  <a:buFont typeface="Arial" panose="020B0604020202020204" pitchFamily="34" charset="0"/>
+                  <a:buChar char="•"/>
+                </a:pPr>
+                <a:r>
+                  <a:rPr lang="en-US" noProof="0" dirty="0"/>
+                  <a:t>What constitutes an outlier is a matter of convention.</a:t>
+                </a:r>
+              </a:p>
+              <a:p>
+                <a:pPr marL="342900" indent="-342900">
+                  <a:lnSpc>
+                    <a:spcPct val="100000"/>
+                  </a:lnSpc>
+                  <a:buFont typeface="Arial" panose="020B0604020202020204" pitchFamily="34" charset="0"/>
+                  <a:buChar char="•"/>
+                </a:pPr>
+                <a:endParaRPr lang="en-US" noProof="0" dirty="0"/>
+              </a:p>
+            </p:txBody>
+          </p:sp>
+        </mc:Choice>
+        <mc:Fallback>
+          <p:sp>
+            <p:nvSpPr>
+              <p:cNvPr id="5" name="Tijdelijke aanduiding voor inhoud 4">
+                <a:extLst>
+                  <a:ext uri="{FF2B5EF4-FFF2-40B4-BE49-F238E27FC236}">
+                    <a16:creationId xmlns:a16="http://schemas.microsoft.com/office/drawing/2014/main" id="{5D72A3FE-9AFB-0265-0AFA-CD556D7B91CA}"/>
+                  </a:ext>
+                </a:extLst>
+              </p:cNvPr>
+              <p:cNvSpPr>
+                <a:spLocks noGrp="1" noRot="1" noChangeAspect="1" noMove="1" noResize="1" noEditPoints="1" noAdjustHandles="1" noChangeArrowheads="1" noChangeShapeType="1" noTextEdit="1"/>
+              </p:cNvSpPr>
+              <p:nvPr>
+                <p:ph type="body" sz="quarter" idx="10"/>
+              </p:nvPr>
+            </p:nvSpPr>
+            <p:spPr>
+              <a:blipFill>
+                <a:blip r:embed="rId2"/>
+                <a:stretch>
+                  <a:fillRect l="-643" t="-890" b="-1187"/>
+                </a:stretch>
+              </a:blipFill>
+            </p:spPr>
+            <p:txBody>
+              <a:bodyPr/>
+              <a:lstStyle/>
+              <a:p>
+                <a:r>
+                  <a:rPr lang="en-US">
+                    <a:noFill/>
+                  </a:rPr>
+                  <a:t> </a:t>
+                </a:r>
+              </a:p>
+            </p:txBody>
+          </p:sp>
+        </mc:Fallback>
+      </mc:AlternateContent>
+    </p:spTree>
+    <p:extLst>
+      <p:ext uri="{BB962C8B-B14F-4D97-AF65-F5344CB8AC3E}">
+        <p14:creationId xmlns:p14="http://schemas.microsoft.com/office/powerpoint/2010/main" val="4081886667"/>
+      </p:ext>
+    </p:extLst>
+  </p:cSld>
+  <p:clrMapOvr>
+    <a:masterClrMapping/>
+  </p:clrMapOvr>
+  <mc:AlternateContent xmlns:mc="http://schemas.openxmlformats.org/markup-compatibility/2006">
+    <mc:Choice xmlns:p14="http://schemas.microsoft.com/office/powerpoint/2010/main" Requires="p14">
+      <p:transition spd="slow" p14:dur="2000" advTm="4519"/>
+    </mc:Choice>
+    <mc:Fallback>
+      <p:transition spd="slow" advTm="4519"/>
+    </mc:Fallback>
+  </mc:AlternateContent>
+</p:sld>
+</file>
+
+<file path=ppt/slides/slide5.xml><?xml version="1.0" encoding="utf-8"?>
+<p:sld xmlns:a="http://schemas.openxmlformats.org/drawingml/2006/main" xmlns:r="http://schemas.openxmlformats.org/officeDocument/2006/relationships" xmlns:p="http://schemas.openxmlformats.org/presentationml/2006/main">
+  <p:cSld>
+    <p:spTree>
+      <p:nvGrpSpPr>
+        <p:cNvPr id="1" name="">
+          <a:extLst>
+            <a:ext uri="{FF2B5EF4-FFF2-40B4-BE49-F238E27FC236}">
+              <a16:creationId xmlns:a16="http://schemas.microsoft.com/office/drawing/2014/main" id="{19EEB812-F931-E646-DF1C-F9AB44187AA1}"/>
+            </a:ext>
+          </a:extLst>
+        </p:cNvPr>
+        <p:cNvGrpSpPr/>
+        <p:nvPr/>
+      </p:nvGrpSpPr>
+      <p:grpSpPr>
+        <a:xfrm>
+          <a:off x="0" y="0"/>
+          <a:ext cx="0" cy="0"/>
+          <a:chOff x="0" y="0"/>
+          <a:chExt cx="0" cy="0"/>
+        </a:xfrm>
+      </p:grpSpPr>
+      <p:sp>
+        <p:nvSpPr>
+          <p:cNvPr id="4" name="Titel 3">
+            <a:extLst>
+              <a:ext uri="{FF2B5EF4-FFF2-40B4-BE49-F238E27FC236}">
+                <a16:creationId xmlns:a16="http://schemas.microsoft.com/office/drawing/2014/main" id="{1052B3FE-1148-D4C3-62C1-837F0ECEA4E8}"/>
+              </a:ext>
+            </a:extLst>
+          </p:cNvPr>
+          <p:cNvSpPr>
+            <a:spLocks noGrp="1"/>
+          </p:cNvSpPr>
+          <p:nvPr>
+            <p:ph type="title"/>
+          </p:nvPr>
+        </p:nvSpPr>
+        <p:spPr/>
+        <p:txBody>
+          <a:bodyPr/>
+          <a:lstStyle/>
+          <a:p>
+            <a:r>
+              <a:rPr lang="en-US" noProof="0" dirty="0"/>
+              <a:t>OUTLIERS (2): ASSUMPTIONS</a:t>
+            </a:r>
+          </a:p>
+        </p:txBody>
+      </p:sp>
+      <p:sp>
+        <p:nvSpPr>
+          <p:cNvPr id="5" name="Tijdelijke aanduiding voor inhoud 4">
+            <a:extLst>
+              <a:ext uri="{FF2B5EF4-FFF2-40B4-BE49-F238E27FC236}">
+                <a16:creationId xmlns:a16="http://schemas.microsoft.com/office/drawing/2014/main" id="{1C7023E2-F213-1E53-F5A4-FEAA7657255F}"/>
+              </a:ext>
+            </a:extLst>
+          </p:cNvPr>
+          <p:cNvSpPr>
+            <a:spLocks noGrp="1"/>
+          </p:cNvSpPr>
+          <p:nvPr>
+            <p:ph type="body" sz="quarter" idx="10"/>
+          </p:nvPr>
+        </p:nvSpPr>
+        <p:spPr/>
+        <p:txBody>
+          <a:bodyPr/>
+          <a:lstStyle/>
+          <a:p>
+            <a:pPr marL="342900" indent="-342900">
+              <a:lnSpc>
+                <a:spcPct val="100000"/>
+              </a:lnSpc>
+              <a:buFont typeface="Arial" panose="020B0604020202020204" pitchFamily="34" charset="0"/>
+              <a:buChar char="•"/>
+            </a:pPr>
+            <a:r>
+              <a:rPr lang="en-US" dirty="0"/>
+              <a:t>If you flag the lowest 25% and the highest 25% as outliers, there should be a clearly recognizable middle 50%.</a:t>
+            </a:r>
+          </a:p>
+          <a:p>
+            <a:pPr marL="342900" indent="-342900">
+              <a:lnSpc>
+                <a:spcPct val="100000"/>
+              </a:lnSpc>
+              <a:buFont typeface="Arial" panose="020B0604020202020204" pitchFamily="34" charset="0"/>
+              <a:buChar char="•"/>
+            </a:pPr>
+            <a:r>
+              <a:rPr lang="en-US" dirty="0"/>
+              <a:t>The Z-score also also makes assumptions about the shape of the data.</a:t>
+            </a:r>
+          </a:p>
+          <a:p>
+            <a:pPr marL="342900" indent="-342900">
+              <a:lnSpc>
+                <a:spcPct val="100000"/>
+              </a:lnSpc>
+              <a:buFont typeface="Arial" panose="020B0604020202020204" pitchFamily="34" charset="0"/>
+              <a:buChar char="•"/>
+            </a:pPr>
+            <a:r>
+              <a:rPr lang="en-US" noProof="0" dirty="0"/>
+              <a:t>Other assumptions:</a:t>
+            </a:r>
+          </a:p>
+          <a:p>
+            <a:pPr marL="728653" lvl="1" indent="-342900">
+              <a:lnSpc>
+                <a:spcPct val="100000"/>
+              </a:lnSpc>
+            </a:pPr>
+            <a:r>
+              <a:rPr lang="en-US" dirty="0"/>
+              <a:t>Data comes from a single population</a:t>
+            </a:r>
+          </a:p>
+          <a:p>
+            <a:pPr marL="728653" lvl="1" indent="-342900">
+              <a:lnSpc>
+                <a:spcPct val="100000"/>
+              </a:lnSpc>
+            </a:pPr>
+            <a:r>
+              <a:rPr lang="en-US" noProof="0" dirty="0"/>
+              <a:t>Data is continuous</a:t>
+            </a:r>
+          </a:p>
+          <a:p>
+            <a:pPr marL="728653" lvl="1" indent="-342900">
+              <a:lnSpc>
+                <a:spcPct val="100000"/>
+              </a:lnSpc>
+            </a:pPr>
+            <a:r>
+              <a:rPr lang="en-US" dirty="0"/>
+              <a:t>Observations are independent</a:t>
+            </a:r>
+          </a:p>
+          <a:p>
+            <a:pPr marL="342900" indent="-342900">
+              <a:lnSpc>
+                <a:spcPct val="100000"/>
+              </a:lnSpc>
+              <a:buFont typeface="Arial" panose="020B0604020202020204" pitchFamily="34" charset="0"/>
+              <a:buChar char="•"/>
+            </a:pPr>
+            <a:r>
+              <a:rPr lang="en-US" noProof="0" dirty="0"/>
+              <a:t>What </a:t>
+            </a:r>
+            <a:r>
+              <a:rPr lang="en-US" dirty="0"/>
+              <a:t>could happen if one or more of these assumptions is not met?</a:t>
+            </a:r>
+            <a:endParaRPr lang="en-US" noProof="0" dirty="0"/>
+          </a:p>
+          <a:p>
+            <a:pPr marL="342900" indent="-342900">
+              <a:lnSpc>
+                <a:spcPct val="100000"/>
+              </a:lnSpc>
+              <a:buFont typeface="Arial" panose="020B0604020202020204" pitchFamily="34" charset="0"/>
+              <a:buChar char="•"/>
+            </a:pPr>
+            <a:endParaRPr lang="en-US" noProof="0" dirty="0"/>
+          </a:p>
+        </p:txBody>
+      </p:sp>
+    </p:spTree>
+    <p:extLst>
+      <p:ext uri="{BB962C8B-B14F-4D97-AF65-F5344CB8AC3E}">
+        <p14:creationId xmlns:p14="http://schemas.microsoft.com/office/powerpoint/2010/main" val="3685978612"/>
+      </p:ext>
+    </p:extLst>
+  </p:cSld>
+  <p:clrMapOvr>
+    <a:masterClrMapping/>
+  </p:clrMapOvr>
+  <mc:AlternateContent xmlns:mc="http://schemas.openxmlformats.org/markup-compatibility/2006">
+    <mc:Choice xmlns:p14="http://schemas.microsoft.com/office/powerpoint/2010/main" Requires="p14">
+      <p:transition spd="slow" p14:dur="2000" advTm="4519"/>
+    </mc:Choice>
+    <mc:Fallback>
+      <p:transition spd="slow" advTm="4519"/>
+    </mc:Fallback>
+  </mc:AlternateContent>
+</p:sld>
+</file>
+
+<file path=ppt/slides/slide6.xml><?xml version="1.0" encoding="utf-8"?>
+<p:sld xmlns:a="http://schemas.openxmlformats.org/drawingml/2006/main" xmlns:r="http://schemas.openxmlformats.org/officeDocument/2006/relationships" xmlns:p="http://schemas.openxmlformats.org/presentationml/2006/main">
+  <p:cSld>
+    <p:spTree>
+      <p:nvGrpSpPr>
+        <p:cNvPr id="1" name="">
+          <a:extLst>
+            <a:ext uri="{FF2B5EF4-FFF2-40B4-BE49-F238E27FC236}">
+              <a16:creationId xmlns:a16="http://schemas.microsoft.com/office/drawing/2014/main" id="{B85CD2EC-A135-D9D8-286D-65C16DEB5D9A}"/>
+            </a:ext>
+          </a:extLst>
+        </p:cNvPr>
+        <p:cNvGrpSpPr/>
+        <p:nvPr/>
+      </p:nvGrpSpPr>
+      <p:grpSpPr>
+        <a:xfrm>
+          <a:off x="0" y="0"/>
+          <a:ext cx="0" cy="0"/>
+          <a:chOff x="0" y="0"/>
+          <a:chExt cx="0" cy="0"/>
+        </a:xfrm>
+      </p:grpSpPr>
+      <p:sp>
+        <p:nvSpPr>
+          <p:cNvPr id="4" name="Titel 3">
+            <a:extLst>
+              <a:ext uri="{FF2B5EF4-FFF2-40B4-BE49-F238E27FC236}">
+                <a16:creationId xmlns:a16="http://schemas.microsoft.com/office/drawing/2014/main" id="{7E86C306-9D4C-4452-B51F-0A4CE8165CE8}"/>
+              </a:ext>
+            </a:extLst>
+          </p:cNvPr>
+          <p:cNvSpPr>
+            <a:spLocks noGrp="1"/>
+          </p:cNvSpPr>
+          <p:nvPr>
+            <p:ph type="title"/>
+          </p:nvPr>
+        </p:nvSpPr>
+        <p:spPr/>
+        <p:txBody>
+          <a:bodyPr/>
+          <a:lstStyle/>
+          <a:p>
+            <a:r>
+              <a:rPr lang="en-US" noProof="0" dirty="0"/>
+              <a:t>OUTLIERS (3): IF DATA IS NOT NORMALLY DISTRIBUTED</a:t>
+            </a:r>
+          </a:p>
+        </p:txBody>
+      </p:sp>
+      <p:sp>
+        <p:nvSpPr>
+          <p:cNvPr id="5" name="Tijdelijke aanduiding voor inhoud 4">
+            <a:extLst>
+              <a:ext uri="{FF2B5EF4-FFF2-40B4-BE49-F238E27FC236}">
+                <a16:creationId xmlns:a16="http://schemas.microsoft.com/office/drawing/2014/main" id="{AC5D88FF-11EF-8F33-1DC1-7FF314B62073}"/>
+              </a:ext>
+            </a:extLst>
+          </p:cNvPr>
+          <p:cNvSpPr>
+            <a:spLocks noGrp="1"/>
+          </p:cNvSpPr>
+          <p:nvPr>
+            <p:ph type="body" sz="quarter" idx="10"/>
+          </p:nvPr>
+        </p:nvSpPr>
+        <p:spPr/>
+        <p:txBody>
+          <a:bodyPr/>
+          <a:lstStyle/>
+          <a:p>
+            <a:pPr marL="342900" indent="-342900">
+              <a:lnSpc>
+                <a:spcPct val="100000"/>
+              </a:lnSpc>
+              <a:buFont typeface="Arial" panose="020B0604020202020204" pitchFamily="34" charset="0"/>
+              <a:buChar char="•"/>
+            </a:pPr>
+            <a:r>
+              <a:rPr lang="en-US" noProof="0" dirty="0"/>
+              <a:t>Try a different method for calculation outliers</a:t>
+            </a:r>
+          </a:p>
+          <a:p>
+            <a:pPr marL="728653" lvl="1" indent="-342900">
+              <a:lnSpc>
+                <a:spcPct val="100000"/>
+              </a:lnSpc>
+            </a:pPr>
+            <a:r>
+              <a:rPr lang="en-US" dirty="0"/>
+              <a:t>EG: Mean Absolute Deviation:</a:t>
+            </a:r>
+          </a:p>
+          <a:p>
+            <a:pPr marL="985821" lvl="2" indent="-342900">
+              <a:lnSpc>
+                <a:spcPct val="100000"/>
+              </a:lnSpc>
+              <a:buFont typeface="+mj-lt"/>
+              <a:buAutoNum type="arabicPeriod"/>
+            </a:pPr>
+            <a:r>
+              <a:rPr lang="en-US" noProof="0" dirty="0"/>
+              <a:t>Calculate the absolute deviation of each data point from the </a:t>
+            </a:r>
+            <a:r>
+              <a:rPr lang="en-US" b="1" noProof="0" dirty="0"/>
+              <a:t>median</a:t>
+            </a:r>
+            <a:r>
+              <a:rPr lang="en-US" noProof="0" dirty="0"/>
+              <a:t> and then apply a scaling factor to it. </a:t>
+            </a:r>
+          </a:p>
+          <a:p>
+            <a:pPr marL="985821" lvl="2" indent="-342900">
+              <a:lnSpc>
+                <a:spcPct val="100000"/>
+              </a:lnSpc>
+              <a:buFont typeface="+mj-lt"/>
+              <a:buAutoNum type="arabicPeriod"/>
+            </a:pPr>
+            <a:r>
+              <a:rPr lang="en-US" dirty="0"/>
+              <a:t>Outliers are all points with </a:t>
+            </a:r>
+            <a:r>
+              <a:rPr lang="en-US" dirty="0" err="1"/>
+              <a:t>MADscaled</a:t>
+            </a:r>
+            <a:r>
+              <a:rPr lang="en-US" dirty="0"/>
+              <a:t> &gt; 2.5 (or some other value)</a:t>
+            </a:r>
+            <a:endParaRPr lang="en-US" noProof="0" dirty="0"/>
+          </a:p>
+          <a:p>
+            <a:pPr marL="342900" indent="-342900">
+              <a:lnSpc>
+                <a:spcPct val="100000"/>
+              </a:lnSpc>
+              <a:buFont typeface="Arial" panose="020B0604020202020204" pitchFamily="34" charset="0"/>
+              <a:buChar char="•"/>
+            </a:pPr>
+            <a:r>
+              <a:rPr lang="en-US" noProof="0" dirty="0"/>
+              <a:t>Turn the distribution into a normal distribution</a:t>
+            </a:r>
+          </a:p>
+          <a:p>
+            <a:pPr marL="728653" lvl="1" indent="-342900">
+              <a:lnSpc>
+                <a:spcPct val="100000"/>
+              </a:lnSpc>
+            </a:pPr>
+            <a:r>
+              <a:rPr lang="en-US" dirty="0"/>
+              <a:t>EG: Apply a log transformation to a log normal distribution and </a:t>
+            </a:r>
+            <a:r>
+              <a:rPr lang="en-US" b="1" dirty="0"/>
+              <a:t>then</a:t>
+            </a:r>
+            <a:r>
+              <a:rPr lang="en-US" dirty="0"/>
+              <a:t> calculate the IQR.</a:t>
+            </a:r>
+          </a:p>
+          <a:p>
+            <a:pPr marL="342900" indent="-342900">
+              <a:lnSpc>
+                <a:spcPct val="100000"/>
+              </a:lnSpc>
+              <a:buFont typeface="Arial" panose="020B0604020202020204" pitchFamily="34" charset="0"/>
+              <a:buChar char="•"/>
+            </a:pPr>
+            <a:r>
+              <a:rPr lang="en-US" noProof="0" dirty="0"/>
+              <a:t>Adjust the cutoff points for the IQR</a:t>
+            </a:r>
+          </a:p>
+          <a:p>
+            <a:pPr marL="728653" lvl="1" indent="-342900">
+              <a:lnSpc>
+                <a:spcPct val="100000"/>
+              </a:lnSpc>
+            </a:pPr>
+            <a:r>
+              <a:rPr lang="en-US" dirty="0"/>
+              <a:t>Useful if the distribution is skewed</a:t>
+            </a:r>
+          </a:p>
+          <a:p>
+            <a:pPr marL="342900" indent="-342900">
+              <a:lnSpc>
+                <a:spcPct val="100000"/>
+              </a:lnSpc>
+              <a:buFont typeface="Arial" panose="020B0604020202020204" pitchFamily="34" charset="0"/>
+              <a:buChar char="•"/>
+            </a:pPr>
+            <a:r>
+              <a:rPr lang="en-US" noProof="0" dirty="0"/>
+              <a:t>Create subgroups and apply outlier detection within each subgroup</a:t>
+            </a:r>
+          </a:p>
+          <a:p>
+            <a:pPr marL="728653" lvl="1" indent="-342900">
+              <a:lnSpc>
+                <a:spcPct val="100000"/>
+              </a:lnSpc>
+            </a:pPr>
+            <a:r>
+              <a:rPr lang="en-US" noProof="0" dirty="0"/>
+              <a:t>Do this if the data is multi modal.</a:t>
+            </a:r>
+          </a:p>
+          <a:p>
+            <a:pPr marL="342900" indent="-342900">
+              <a:lnSpc>
+                <a:spcPct val="100000"/>
+              </a:lnSpc>
+              <a:buFont typeface="Arial" panose="020B0604020202020204" pitchFamily="34" charset="0"/>
+              <a:buChar char="•"/>
+            </a:pPr>
+            <a:endParaRPr lang="en-US" noProof="0" dirty="0"/>
+          </a:p>
+          <a:p>
+            <a:pPr marL="342900" indent="-342900">
+              <a:lnSpc>
+                <a:spcPct val="100000"/>
+              </a:lnSpc>
+              <a:buFont typeface="Arial" panose="020B0604020202020204" pitchFamily="34" charset="0"/>
+              <a:buChar char="•"/>
+            </a:pPr>
+            <a:endParaRPr lang="en-US" noProof="0" dirty="0"/>
+          </a:p>
+        </p:txBody>
+      </p:sp>
+    </p:spTree>
+    <p:extLst>
+      <p:ext uri="{BB962C8B-B14F-4D97-AF65-F5344CB8AC3E}">
+        <p14:creationId xmlns:p14="http://schemas.microsoft.com/office/powerpoint/2010/main" val="65760180"/>
+      </p:ext>
+    </p:extLst>
+  </p:cSld>
+  <p:clrMapOvr>
+    <a:masterClrMapping/>
+  </p:clrMapOvr>
+  <mc:AlternateContent xmlns:mc="http://schemas.openxmlformats.org/markup-compatibility/2006">
+    <mc:Choice xmlns:p14="http://schemas.microsoft.com/office/powerpoint/2010/main" Requires="p14">
+      <p:transition spd="slow" p14:dur="2000" advTm="4519"/>
+    </mc:Choice>
+    <mc:Fallback>
+      <p:transition spd="slow" advTm="4519"/>
+    </mc:Fallback>
+  </mc:AlternateContent>
+</p:sld>
+</file>
+
+<file path=ppt/slides/slide7.xml><?xml version="1.0" encoding="utf-8"?>
+<p:sld xmlns:a="http://schemas.openxmlformats.org/drawingml/2006/main" xmlns:r="http://schemas.openxmlformats.org/officeDocument/2006/relationships" xmlns:p="http://schemas.openxmlformats.org/presentationml/2006/main">
+  <p:cSld>
+    <p:spTree>
+      <p:nvGrpSpPr>
+        <p:cNvPr id="1" name="">
+          <a:extLst>
+            <a:ext uri="{FF2B5EF4-FFF2-40B4-BE49-F238E27FC236}">
+              <a16:creationId xmlns:a16="http://schemas.microsoft.com/office/drawing/2014/main" id="{0C468451-BC59-85A8-3221-7760D47CEF58}"/>
+            </a:ext>
+          </a:extLst>
+        </p:cNvPr>
+        <p:cNvGrpSpPr/>
+        <p:nvPr/>
+      </p:nvGrpSpPr>
+      <p:grpSpPr>
+        <a:xfrm>
+          <a:off x="0" y="0"/>
+          <a:ext cx="0" cy="0"/>
+          <a:chOff x="0" y="0"/>
+          <a:chExt cx="0" cy="0"/>
+        </a:xfrm>
+      </p:grpSpPr>
+      <p:sp>
+        <p:nvSpPr>
+          <p:cNvPr id="4" name="Titel 3">
+            <a:extLst>
+              <a:ext uri="{FF2B5EF4-FFF2-40B4-BE49-F238E27FC236}">
+                <a16:creationId xmlns:a16="http://schemas.microsoft.com/office/drawing/2014/main" id="{AE864953-48C4-B951-3C69-B0A6526782F0}"/>
+              </a:ext>
+            </a:extLst>
+          </p:cNvPr>
+          <p:cNvSpPr>
+            <a:spLocks noGrp="1"/>
+          </p:cNvSpPr>
+          <p:nvPr>
+            <p:ph type="title"/>
+          </p:nvPr>
+        </p:nvSpPr>
+        <p:spPr/>
+        <p:txBody>
+          <a:bodyPr/>
+          <a:lstStyle/>
+          <a:p>
+            <a:r>
+              <a:rPr lang="en-US" noProof="0" dirty="0"/>
+              <a:t>OUTLIERS (3): OUTLIERS ARE NOT ERRONEOUS DATA</a:t>
+            </a:r>
+          </a:p>
+        </p:txBody>
+      </p:sp>
+      <p:sp>
+        <p:nvSpPr>
+          <p:cNvPr id="5" name="Tijdelijke aanduiding voor inhoud 4">
+            <a:extLst>
+              <a:ext uri="{FF2B5EF4-FFF2-40B4-BE49-F238E27FC236}">
+                <a16:creationId xmlns:a16="http://schemas.microsoft.com/office/drawing/2014/main" id="{E4141E54-5952-CF48-2AFD-482E4958F89C}"/>
+              </a:ext>
+            </a:extLst>
+          </p:cNvPr>
+          <p:cNvSpPr>
+            <a:spLocks noGrp="1"/>
+          </p:cNvSpPr>
+          <p:nvPr>
+            <p:ph type="body" sz="quarter" idx="10"/>
+          </p:nvPr>
+        </p:nvSpPr>
+        <p:spPr/>
+        <p:txBody>
+          <a:bodyPr/>
+          <a:lstStyle/>
+          <a:p>
+            <a:pPr marL="342900" indent="-342900">
+              <a:lnSpc>
+                <a:spcPct val="100000"/>
+              </a:lnSpc>
+              <a:buFont typeface="Arial" panose="020B0604020202020204" pitchFamily="34" charset="0"/>
+              <a:buChar char="•"/>
+            </a:pPr>
+            <a:r>
+              <a:rPr lang="en-US" b="1" dirty="0"/>
+              <a:t>Even if the data is normally distributed, the fact that a data point is an outlier does not in itself mean anything!</a:t>
+            </a:r>
+            <a:endParaRPr lang="en-US" b="1" noProof="0" dirty="0"/>
+          </a:p>
+          <a:p>
+            <a:pPr>
+              <a:lnSpc>
+                <a:spcPct val="100000"/>
+              </a:lnSpc>
+            </a:pPr>
+            <a:endParaRPr lang="en-US" noProof="0" dirty="0"/>
+          </a:p>
+          <a:p>
+            <a:pPr marL="342900" indent="-342900">
+              <a:lnSpc>
+                <a:spcPct val="100000"/>
+              </a:lnSpc>
+              <a:buFont typeface="Arial" panose="020B0604020202020204" pitchFamily="34" charset="0"/>
+              <a:buChar char="•"/>
+            </a:pPr>
+            <a:endParaRPr lang="en-US" noProof="0" dirty="0"/>
+          </a:p>
+        </p:txBody>
+      </p:sp>
+      <p:graphicFrame>
+        <p:nvGraphicFramePr>
+          <p:cNvPr id="2" name="Tabel 1">
+            <a:extLst>
+              <a:ext uri="{FF2B5EF4-FFF2-40B4-BE49-F238E27FC236}">
+                <a16:creationId xmlns:a16="http://schemas.microsoft.com/office/drawing/2014/main" id="{07E0CEA1-D7DF-87A5-A134-F76EBF5E86C3}"/>
+              </a:ext>
+            </a:extLst>
+          </p:cNvPr>
+          <p:cNvGraphicFramePr>
+            <a:graphicFrameLocks noGrp="1"/>
+          </p:cNvGraphicFramePr>
+          <p:nvPr>
+            <p:extLst>
+              <p:ext uri="{D42A27DB-BD31-4B8C-83A1-F6EECF244321}">
+                <p14:modId xmlns:p14="http://schemas.microsoft.com/office/powerpoint/2010/main" val="2485667468"/>
+              </p:ext>
+            </p:extLst>
+          </p:nvPr>
+        </p:nvGraphicFramePr>
+        <p:xfrm>
+          <a:off x="1524000" y="3128169"/>
+          <a:ext cx="6096000" cy="1854200"/>
+        </p:xfrm>
+        <a:graphic>
+          <a:graphicData uri="http://schemas.openxmlformats.org/drawingml/2006/table">
+            <a:tbl>
+              <a:tblPr firstRow="1" bandRow="1">
+                <a:tableStyleId>{073A0DAA-6AF3-43AB-8588-CEC1D06C72B9}</a:tableStyleId>
+              </a:tblPr>
+              <a:tblGrid>
+                <a:gridCol w="3048000">
+                  <a:extLst>
+                    <a:ext uri="{9D8B030D-6E8A-4147-A177-3AD203B41FA5}">
+                      <a16:colId xmlns:a16="http://schemas.microsoft.com/office/drawing/2014/main" val="3088853166"/>
+                    </a:ext>
+                  </a:extLst>
+                </a:gridCol>
+                <a:gridCol w="3048000">
+                  <a:extLst>
+                    <a:ext uri="{9D8B030D-6E8A-4147-A177-3AD203B41FA5}">
+                      <a16:colId xmlns:a16="http://schemas.microsoft.com/office/drawing/2014/main" val="1251919470"/>
+                    </a:ext>
+                  </a:extLst>
+                </a:gridCol>
+              </a:tblGrid>
+              <a:tr h="370840">
+                <a:tc>
+                  <a:txBody>
+                    <a:bodyPr/>
+                    <a:lstStyle/>
+                    <a:p>
+                      <a:r>
+                        <a:rPr lang="en-US" sz="1400" dirty="0">
+                          <a:latin typeface="Arial" panose="020B0604020202020204" pitchFamily="34" charset="0"/>
+                          <a:cs typeface="Arial" panose="020B0604020202020204" pitchFamily="34" charset="0"/>
+                        </a:rPr>
+                        <a:t>Outliers</a:t>
+                      </a:r>
+                    </a:p>
+                  </a:txBody>
+                  <a:tcPr/>
+                </a:tc>
+                <a:tc>
+                  <a:txBody>
+                    <a:bodyPr/>
+                    <a:lstStyle/>
+                    <a:p>
+                      <a:r>
+                        <a:rPr lang="en-US" sz="1400" dirty="0">
+                          <a:latin typeface="Arial" panose="020B0604020202020204" pitchFamily="34" charset="0"/>
+                          <a:cs typeface="Arial" panose="020B0604020202020204" pitchFamily="34" charset="0"/>
+                        </a:rPr>
+                        <a:t>Erroneous data</a:t>
+                      </a:r>
+                    </a:p>
+                  </a:txBody>
+                  <a:tcPr/>
+                </a:tc>
+                <a:extLst>
+                  <a:ext uri="{0D108BD9-81ED-4DB2-BD59-A6C34878D82A}">
+                    <a16:rowId xmlns:a16="http://schemas.microsoft.com/office/drawing/2014/main" val="3161158726"/>
+                  </a:ext>
+                </a:extLst>
+              </a:tr>
+              <a:tr h="370840">
+                <a:tc>
+                  <a:txBody>
+                    <a:bodyPr/>
+                    <a:lstStyle/>
+                    <a:p>
+                      <a:r>
+                        <a:rPr lang="en-US" sz="1400" dirty="0">
+                          <a:latin typeface="Arial" panose="020B0604020202020204" pitchFamily="34" charset="0"/>
+                          <a:cs typeface="Arial" panose="020B0604020202020204" pitchFamily="34" charset="0"/>
+                        </a:rPr>
+                        <a:t>Unusual but valid observations</a:t>
+                      </a:r>
+                    </a:p>
+                  </a:txBody>
+                  <a:tcPr/>
+                </a:tc>
+                <a:tc>
+                  <a:txBody>
+                    <a:bodyPr/>
+                    <a:lstStyle/>
+                    <a:p>
+                      <a:r>
+                        <a:rPr lang="en-US" sz="1400" dirty="0">
+                          <a:latin typeface="Arial" panose="020B0604020202020204" pitchFamily="34" charset="0"/>
+                          <a:cs typeface="Arial" panose="020B0604020202020204" pitchFamily="34" charset="0"/>
+                        </a:rPr>
+                        <a:t>Invalid data points</a:t>
+                      </a:r>
+                    </a:p>
+                  </a:txBody>
+                  <a:tcPr/>
+                </a:tc>
+                <a:extLst>
+                  <a:ext uri="{0D108BD9-81ED-4DB2-BD59-A6C34878D82A}">
+                    <a16:rowId xmlns:a16="http://schemas.microsoft.com/office/drawing/2014/main" val="430590194"/>
+                  </a:ext>
+                </a:extLst>
+              </a:tr>
+              <a:tr h="370840">
+                <a:tc>
+                  <a:txBody>
+                    <a:bodyPr/>
+                    <a:lstStyle/>
+                    <a:p>
+                      <a:r>
+                        <a:rPr lang="en-US" sz="1400" dirty="0">
+                          <a:latin typeface="Arial" panose="020B0604020202020204" pitchFamily="34" charset="0"/>
+                          <a:cs typeface="Arial" panose="020B0604020202020204" pitchFamily="34" charset="0"/>
+                        </a:rPr>
+                        <a:t>Can provide valuable insights</a:t>
+                      </a:r>
+                    </a:p>
+                  </a:txBody>
+                  <a:tcPr/>
+                </a:tc>
+                <a:tc>
+                  <a:txBody>
+                    <a:bodyPr/>
+                    <a:lstStyle/>
+                    <a:p>
+                      <a:r>
+                        <a:rPr lang="en-US" sz="1400" dirty="0">
+                          <a:latin typeface="Arial" panose="020B0604020202020204" pitchFamily="34" charset="0"/>
+                          <a:cs typeface="Arial" panose="020B0604020202020204" pitchFamily="34" charset="0"/>
+                        </a:rPr>
+                        <a:t>Should be corrected or removed</a:t>
+                      </a:r>
+                    </a:p>
+                  </a:txBody>
+                  <a:tcPr/>
+                </a:tc>
+                <a:extLst>
+                  <a:ext uri="{0D108BD9-81ED-4DB2-BD59-A6C34878D82A}">
+                    <a16:rowId xmlns:a16="http://schemas.microsoft.com/office/drawing/2014/main" val="3555177810"/>
+                  </a:ext>
+                </a:extLst>
+              </a:tr>
+              <a:tr h="370840">
+                <a:tc>
+                  <a:txBody>
+                    <a:bodyPr/>
+                    <a:lstStyle/>
+                    <a:p>
+                      <a:r>
+                        <a:rPr lang="en-US" sz="1400" dirty="0">
+                          <a:latin typeface="Arial" panose="020B0604020202020204" pitchFamily="34" charset="0"/>
+                          <a:cs typeface="Arial" panose="020B0604020202020204" pitchFamily="34" charset="0"/>
+                        </a:rPr>
+                        <a:t>Domain specific</a:t>
+                      </a:r>
+                    </a:p>
+                  </a:txBody>
+                  <a:tcPr/>
+                </a:tc>
+                <a:tc>
+                  <a:txBody>
+                    <a:bodyPr/>
+                    <a:lstStyle/>
+                    <a:p>
+                      <a:r>
+                        <a:rPr lang="en-US" sz="1400" dirty="0">
+                          <a:latin typeface="Arial" panose="020B0604020202020204" pitchFamily="34" charset="0"/>
+                          <a:cs typeface="Arial" panose="020B0604020202020204" pitchFamily="34" charset="0"/>
+                        </a:rPr>
+                        <a:t>Validation rules</a:t>
+                      </a:r>
+                    </a:p>
+                  </a:txBody>
+                  <a:tcPr/>
+                </a:tc>
+                <a:extLst>
+                  <a:ext uri="{0D108BD9-81ED-4DB2-BD59-A6C34878D82A}">
+                    <a16:rowId xmlns:a16="http://schemas.microsoft.com/office/drawing/2014/main" val="3306715563"/>
+                  </a:ext>
+                </a:extLst>
+              </a:tr>
+              <a:tr h="370840">
+                <a:tc>
+                  <a:txBody>
+                    <a:bodyPr/>
+                    <a:lstStyle/>
+                    <a:p>
+                      <a:r>
+                        <a:rPr lang="en-US" sz="1400" dirty="0">
+                          <a:latin typeface="Arial" panose="020B0604020202020204" pitchFamily="34" charset="0"/>
+                          <a:cs typeface="Arial" panose="020B0604020202020204" pitchFamily="34" charset="0"/>
+                        </a:rPr>
+                        <a:t>May indicate important phenomena</a:t>
+                      </a:r>
+                    </a:p>
+                  </a:txBody>
+                  <a:tcPr/>
+                </a:tc>
+                <a:tc>
+                  <a:txBody>
+                    <a:bodyPr/>
+                    <a:lstStyle/>
+                    <a:p>
+                      <a:r>
+                        <a:rPr lang="en-US" sz="1400" dirty="0">
+                          <a:latin typeface="Arial" panose="020B0604020202020204" pitchFamily="34" charset="0"/>
+                          <a:cs typeface="Arial" panose="020B0604020202020204" pitchFamily="34" charset="0"/>
+                        </a:rPr>
+                        <a:t>Measurement / entry errors</a:t>
+                      </a:r>
+                    </a:p>
+                  </a:txBody>
+                  <a:tcPr/>
+                </a:tc>
+                <a:extLst>
+                  <a:ext uri="{0D108BD9-81ED-4DB2-BD59-A6C34878D82A}">
+                    <a16:rowId xmlns:a16="http://schemas.microsoft.com/office/drawing/2014/main" val="2618693803"/>
+                  </a:ext>
+                </a:extLst>
+              </a:tr>
+            </a:tbl>
+          </a:graphicData>
+        </a:graphic>
+      </p:graphicFrame>
+    </p:spTree>
+    <p:extLst>
+      <p:ext uri="{BB962C8B-B14F-4D97-AF65-F5344CB8AC3E}">
+        <p14:creationId xmlns:p14="http://schemas.microsoft.com/office/powerpoint/2010/main" val="3560150794"/>
+      </p:ext>
+    </p:extLst>
+  </p:cSld>
+  <p:clrMapOvr>
+    <a:masterClrMapping/>
+  </p:clrMapOvr>
+  <mc:AlternateContent xmlns:mc="http://schemas.openxmlformats.org/markup-compatibility/2006">
+    <mc:Choice xmlns:p14="http://schemas.microsoft.com/office/powerpoint/2010/main" Requires="p14">
+      <p:transition spd="slow" p14:dur="2000" advTm="4519"/>
+    </mc:Choice>
+    <mc:Fallback>
+      <p:transition spd="slow" advTm="4519"/>
+    </mc:Fallback>
+  </mc:AlternateContent>
+</p:sld>
+</file>
+
+<file path=ppt/slides/slide8.xml><?xml version="1.0" encoding="utf-8"?>
+<p:sld xmlns:a="http://schemas.openxmlformats.org/drawingml/2006/main" xmlns:r="http://schemas.openxmlformats.org/officeDocument/2006/relationships" xmlns:p="http://schemas.openxmlformats.org/presentationml/2006/main">
+  <p:cSld>
+    <p:spTree>
+      <p:nvGrpSpPr>
+        <p:cNvPr id="1" name="">
+          <a:extLst>
+            <a:ext uri="{FF2B5EF4-FFF2-40B4-BE49-F238E27FC236}">
+              <a16:creationId xmlns:a16="http://schemas.microsoft.com/office/drawing/2014/main" id="{F3328ACB-51EC-469A-7B63-3DFE9C274F83}"/>
+            </a:ext>
+          </a:extLst>
+        </p:cNvPr>
+        <p:cNvGrpSpPr/>
+        <p:nvPr/>
+      </p:nvGrpSpPr>
+      <p:grpSpPr>
+        <a:xfrm>
+          <a:off x="0" y="0"/>
+          <a:ext cx="0" cy="0"/>
+          <a:chOff x="0" y="0"/>
+          <a:chExt cx="0" cy="0"/>
+        </a:xfrm>
+      </p:grpSpPr>
+      <p:sp>
+        <p:nvSpPr>
+          <p:cNvPr id="4" name="Titel 3">
+            <a:extLst>
+              <a:ext uri="{FF2B5EF4-FFF2-40B4-BE49-F238E27FC236}">
+                <a16:creationId xmlns:a16="http://schemas.microsoft.com/office/drawing/2014/main" id="{B6593086-4EBA-B3A6-6F6F-18B530A7AB19}"/>
+              </a:ext>
+            </a:extLst>
+          </p:cNvPr>
+          <p:cNvSpPr>
+            <a:spLocks noGrp="1"/>
+          </p:cNvSpPr>
+          <p:nvPr>
+            <p:ph type="title"/>
+          </p:nvPr>
+        </p:nvSpPr>
+        <p:spPr/>
+        <p:txBody>
+          <a:bodyPr/>
+          <a:lstStyle/>
+          <a:p>
+            <a:r>
+              <a:rPr lang="en-US" noProof="0" dirty="0"/>
+              <a:t>OUTLIERS (4): BEST PRACTICES</a:t>
+            </a:r>
+          </a:p>
+        </p:txBody>
+      </p:sp>
+      <p:sp>
+        <p:nvSpPr>
+          <p:cNvPr id="5" name="Tijdelijke aanduiding voor inhoud 4">
+            <a:extLst>
+              <a:ext uri="{FF2B5EF4-FFF2-40B4-BE49-F238E27FC236}">
+                <a16:creationId xmlns:a16="http://schemas.microsoft.com/office/drawing/2014/main" id="{8490D013-2508-4274-54C9-549B66BDBE8C}"/>
+              </a:ext>
+            </a:extLst>
+          </p:cNvPr>
+          <p:cNvSpPr>
+            <a:spLocks noGrp="1"/>
+          </p:cNvSpPr>
+          <p:nvPr>
+            <p:ph type="body" sz="quarter" idx="10"/>
+          </p:nvPr>
+        </p:nvSpPr>
+        <p:spPr/>
+        <p:txBody>
+          <a:bodyPr>
+            <a:normAutofit/>
+          </a:bodyPr>
+          <a:lstStyle/>
+          <a:p>
+            <a:pPr marL="342900" indent="-342900">
+              <a:lnSpc>
+                <a:spcPct val="100000"/>
+              </a:lnSpc>
+              <a:buFont typeface="Arial" panose="020B0604020202020204" pitchFamily="34" charset="0"/>
+              <a:buChar char="•"/>
+            </a:pPr>
+            <a:r>
+              <a:rPr lang="en-US" dirty="0"/>
+              <a:t>Investigate before removing:</a:t>
+            </a:r>
+          </a:p>
+          <a:p>
+            <a:pPr marL="728653" lvl="1" indent="-342900">
+              <a:lnSpc>
+                <a:spcPct val="100000"/>
+              </a:lnSpc>
+            </a:pPr>
+            <a:r>
+              <a:rPr lang="en-US" dirty="0"/>
+              <a:t>Check for data entry / coding errors.</a:t>
+            </a:r>
+          </a:p>
+          <a:p>
+            <a:pPr marL="728653" lvl="1" indent="-342900">
+              <a:lnSpc>
+                <a:spcPct val="100000"/>
+              </a:lnSpc>
+            </a:pPr>
+            <a:r>
+              <a:rPr lang="en-US" dirty="0"/>
+              <a:t>Verify measurement accuracy.</a:t>
+            </a:r>
+          </a:p>
+          <a:p>
+            <a:pPr marL="728653" lvl="1" indent="-342900">
+              <a:lnSpc>
+                <a:spcPct val="100000"/>
+              </a:lnSpc>
+            </a:pPr>
+            <a:r>
+              <a:rPr lang="en-US" dirty="0"/>
+              <a:t>Make sure you understand the domain.</a:t>
+            </a:r>
+          </a:p>
+          <a:p>
+            <a:pPr marL="342900" indent="-342900">
+              <a:lnSpc>
+                <a:spcPct val="100000"/>
+              </a:lnSpc>
+              <a:buFont typeface="Arial" panose="020B0604020202020204" pitchFamily="34" charset="0"/>
+              <a:buChar char="•"/>
+            </a:pPr>
+            <a:r>
+              <a:rPr lang="en-US" dirty="0"/>
+              <a:t>Document decisions:</a:t>
+            </a:r>
+          </a:p>
+          <a:p>
+            <a:pPr marL="728653" lvl="1" indent="-342900">
+              <a:lnSpc>
+                <a:spcPct val="100000"/>
+              </a:lnSpc>
+            </a:pPr>
+            <a:r>
+              <a:rPr lang="en-US" dirty="0"/>
+              <a:t>Record which values were modified and why.</a:t>
+            </a:r>
+          </a:p>
+          <a:p>
+            <a:pPr marL="728653" lvl="1" indent="-342900">
+              <a:lnSpc>
+                <a:spcPct val="100000"/>
+              </a:lnSpc>
+            </a:pPr>
+            <a:r>
+              <a:rPr lang="en-US" dirty="0"/>
+              <a:t>Be transparent about criteria used.</a:t>
+            </a:r>
+          </a:p>
+          <a:p>
+            <a:pPr marL="728653" lvl="1" indent="-342900">
+              <a:lnSpc>
+                <a:spcPct val="100000"/>
+              </a:lnSpc>
+            </a:pPr>
+            <a:r>
+              <a:rPr lang="en-US" dirty="0"/>
+              <a:t>Make sure your work </a:t>
+            </a:r>
+            <a:r>
+              <a:rPr lang="en-US"/>
+              <a:t>is reproducible</a:t>
+            </a:r>
+            <a:endParaRPr lang="en-US" dirty="0"/>
+          </a:p>
+          <a:p>
+            <a:pPr marL="342900" indent="-342900">
+              <a:lnSpc>
+                <a:spcPct val="100000"/>
+              </a:lnSpc>
+              <a:buFont typeface="Arial" panose="020B0604020202020204" pitchFamily="34" charset="0"/>
+              <a:buChar char="•"/>
+            </a:pPr>
+            <a:r>
+              <a:rPr lang="en-US" dirty="0"/>
+              <a:t>Sensitivity analysis:</a:t>
+            </a:r>
+          </a:p>
+          <a:p>
+            <a:pPr marL="728653" lvl="1" indent="-342900">
+              <a:lnSpc>
+                <a:spcPct val="100000"/>
+              </a:lnSpc>
+            </a:pPr>
+            <a:r>
+              <a:rPr lang="en-US" dirty="0"/>
+              <a:t>Run analyses with and without outliers.</a:t>
+            </a:r>
+          </a:p>
+          <a:p>
+            <a:pPr marL="728653" lvl="1" indent="-342900">
+              <a:lnSpc>
+                <a:spcPct val="100000"/>
+              </a:lnSpc>
+            </a:pPr>
+            <a:r>
+              <a:rPr lang="en-US" dirty="0"/>
+              <a:t>Report differences in results.</a:t>
+            </a:r>
+            <a:endParaRPr lang="en-US" noProof="0" dirty="0"/>
+          </a:p>
+          <a:p>
+            <a:pPr marL="342900" indent="-342900">
+              <a:lnSpc>
+                <a:spcPct val="100000"/>
+              </a:lnSpc>
+              <a:buFont typeface="Arial" panose="020B0604020202020204" pitchFamily="34" charset="0"/>
+              <a:buChar char="•"/>
+            </a:pPr>
+            <a:endParaRPr lang="en-US" noProof="0" dirty="0"/>
+          </a:p>
+        </p:txBody>
+      </p:sp>
+    </p:spTree>
+    <p:extLst>
+      <p:ext uri="{BB962C8B-B14F-4D97-AF65-F5344CB8AC3E}">
+        <p14:creationId xmlns:p14="http://schemas.microsoft.com/office/powerpoint/2010/main" val="170735079"/>
+      </p:ext>
+    </p:extLst>
+  </p:cSld>
+  <p:clrMapOvr>
+    <a:masterClrMapping/>
+  </p:clrMapOvr>
+  <mc:AlternateContent xmlns:mc="http://schemas.openxmlformats.org/markup-compatibility/2006">
+    <mc:Choice xmlns:p14="http://schemas.microsoft.com/office/powerpoint/2010/main" Requires="p14">
+      <p:transition spd="slow" p14:dur="2000" advTm="4519"/>
+    </mc:Choice>
+    <mc:Fallback>
+      <p:transition spd="slow" advTm="4519"/>
+    </mc:Fallback>
+  </mc:AlternateContent>
+</p:sld>
+</file>
+
+<file path=ppt/slides/slide9.xml><?xml version="1.0" encoding="utf-8"?>
+<p:sld xmlns:a="http://schemas.openxmlformats.org/drawingml/2006/main" xmlns:r="http://schemas.openxmlformats.org/officeDocument/2006/relationships" xmlns:p="http://schemas.openxmlformats.org/presentationml/2006/main">
+  <p:cSld>
+    <p:spTree>
+      <p:nvGrpSpPr>
+        <p:cNvPr id="1" name="">
+          <a:extLst>
+            <a:ext uri="{FF2B5EF4-FFF2-40B4-BE49-F238E27FC236}">
+              <a16:creationId xmlns:a16="http://schemas.microsoft.com/office/drawing/2014/main" id="{32A2BE81-5DE4-5887-6797-CC7E9BADB88F}"/>
+            </a:ext>
+          </a:extLst>
+        </p:cNvPr>
+        <p:cNvGrpSpPr/>
+        <p:nvPr/>
+      </p:nvGrpSpPr>
+      <p:grpSpPr>
+        <a:xfrm>
+          <a:off x="0" y="0"/>
+          <a:ext cx="0" cy="0"/>
+          <a:chOff x="0" y="0"/>
+          <a:chExt cx="0" cy="0"/>
+        </a:xfrm>
+      </p:grpSpPr>
+      <p:sp>
+        <p:nvSpPr>
+          <p:cNvPr id="4" name="Titel 3">
+            <a:extLst>
+              <a:ext uri="{FF2B5EF4-FFF2-40B4-BE49-F238E27FC236}">
+                <a16:creationId xmlns:a16="http://schemas.microsoft.com/office/drawing/2014/main" id="{B21FE48D-E536-FD45-7385-A30C55440375}"/>
+              </a:ext>
+            </a:extLst>
+          </p:cNvPr>
+          <p:cNvSpPr>
+            <a:spLocks noGrp="1"/>
+          </p:cNvSpPr>
+          <p:nvPr>
+            <p:ph type="title"/>
+          </p:nvPr>
+        </p:nvSpPr>
+        <p:spPr/>
+        <p:txBody>
+          <a:bodyPr/>
+          <a:lstStyle/>
+          <a:p>
+            <a:r>
+              <a:rPr lang="en-US" noProof="0" dirty="0"/>
+              <a:t>TITEL SLIDE</a:t>
+            </a:r>
+          </a:p>
+        </p:txBody>
+      </p:sp>
+      <p:sp>
+        <p:nvSpPr>
+          <p:cNvPr id="5" name="Tijdelijke aanduiding voor inhoud 4">
+            <a:extLst>
+              <a:ext uri="{FF2B5EF4-FFF2-40B4-BE49-F238E27FC236}">
+                <a16:creationId xmlns:a16="http://schemas.microsoft.com/office/drawing/2014/main" id="{B2C78952-D571-EEB6-84D6-093187344CF0}"/>
+              </a:ext>
+            </a:extLst>
+          </p:cNvPr>
+          <p:cNvSpPr>
+            <a:spLocks noGrp="1"/>
+          </p:cNvSpPr>
+          <p:nvPr>
+            <p:ph type="body" sz="quarter" idx="10"/>
+          </p:nvPr>
+        </p:nvSpPr>
+        <p:spPr/>
+        <p:txBody>
+          <a:bodyPr/>
+          <a:lstStyle/>
+          <a:p>
+            <a:pPr marL="342900" indent="-342900">
+              <a:lnSpc>
+                <a:spcPct val="100000"/>
+              </a:lnSpc>
+              <a:buFont typeface="Arial" panose="020B0604020202020204" pitchFamily="34" charset="0"/>
+              <a:buChar char="•"/>
+            </a:pPr>
+            <a:r>
+              <a:rPr lang="en-US" b="1" noProof="0" dirty="0"/>
+              <a:t>Verder </a:t>
+            </a:r>
+            <a:r>
+              <a:rPr lang="en-US" b="1" noProof="0" dirty="0" err="1"/>
+              <a:t>alles</a:t>
+            </a:r>
+            <a:endParaRPr lang="en-US" b="1" noProof="0" dirty="0"/>
+          </a:p>
+          <a:p>
+            <a:pPr marL="342900" indent="-342900">
+              <a:lnSpc>
+                <a:spcPct val="100000"/>
+              </a:lnSpc>
+              <a:buFont typeface="Arial" panose="020B0604020202020204" pitchFamily="34" charset="0"/>
+              <a:buChar char="•"/>
+            </a:pPr>
+            <a:r>
+              <a:rPr lang="en-US" b="1" noProof="0" dirty="0"/>
+              <a:t>In Arial</a:t>
+            </a:r>
+          </a:p>
+          <a:p>
+            <a:pPr marL="342900" indent="-342900">
+              <a:lnSpc>
+                <a:spcPct val="100000"/>
+              </a:lnSpc>
+              <a:buFont typeface="Arial" panose="020B0604020202020204" pitchFamily="34" charset="0"/>
+              <a:buChar char="•"/>
+            </a:pPr>
+            <a:endParaRPr lang="en-US" noProof="0" dirty="0"/>
+          </a:p>
+          <a:p>
+            <a:pPr marL="342900" indent="-342900">
+              <a:lnSpc>
+                <a:spcPct val="100000"/>
+              </a:lnSpc>
+              <a:buFont typeface="Arial" panose="020B0604020202020204" pitchFamily="34" charset="0"/>
+              <a:buChar char="•"/>
+            </a:pPr>
+            <a:endParaRPr lang="en-US" noProof="0" dirty="0"/>
+          </a:p>
+        </p:txBody>
+      </p:sp>
+    </p:spTree>
+    <p:extLst>
+      <p:ext uri="{BB962C8B-B14F-4D97-AF65-F5344CB8AC3E}">
+        <p14:creationId xmlns:p14="http://schemas.microsoft.com/office/powerpoint/2010/main" val="2367867850"/>
+      </p:ext>
+    </p:extLst>
+  </p:cSld>
+  <p:clrMapOvr>
+    <a:masterClrMapping/>
+  </p:clrMapOvr>
+  <mc:AlternateContent xmlns:mc="http://schemas.openxmlformats.org/markup-compatibility/2006">
+    <mc:Choice xmlns:p14="http://schemas.microsoft.com/office/powerpoint/2010/main" Requires="p14">
+      <p:transition spd="slow" p14:dur="2000" advTm="4519"/>
+    </mc:Choice>
+    <mc:Fallback>
       <p:transition spd="slow" advTm="4519"/>
     </mc:Fallback>
   </mc:AlternateContent>
@@ -3351,15 +5386,6 @@
 </file>
 
 <file path=customXml/item2.xml><?xml version="1.0" encoding="utf-8"?>
-<?mso-contentType ?>
-<FormTemplates xmlns="http://schemas.microsoft.com/sharepoint/v3/contenttype/forms">
-  <Display>DocumentLibraryForm</Display>
-  <Edit>DocumentLibraryForm</Edit>
-  <New>DocumentLibraryForm</New>
-</FormTemplates>
-</file>
-
-<file path=customXml/item3.xml><?xml version="1.0" encoding="utf-8"?>
 <ct:contentTypeSchema xmlns:ct="http://schemas.microsoft.com/office/2006/metadata/contentType" xmlns:ma="http://schemas.microsoft.com/office/2006/metadata/properties/metaAttributes" ct:_="" ma:_="" ma:contentTypeName="Document" ma:contentTypeID="0x010100B2C6846675690041B0AEF76721A33550" ma:contentTypeVersion="12" ma:contentTypeDescription="Een nieuw document maken." ma:contentTypeScope="" ma:versionID="7d80b5b27cb88b7e670b1fbb7cd7de23">
   <xsd:schema xmlns:xsd="http://www.w3.org/2001/XMLSchema" xmlns:xs="http://www.w3.org/2001/XMLSchema" xmlns:p="http://schemas.microsoft.com/office/2006/metadata/properties" xmlns:ns2="6b01692f-8f45-4310-abfd-accd438f234f" xmlns:ns3="41d33a03-4c74-4b4d-8466-39dbc86d9cdb" targetNamespace="http://schemas.microsoft.com/office/2006/metadata/properties" ma:root="true" ma:fieldsID="2679454ac823c4dc22358f51a5683c7b" ns2:_="" ns3:_="">
     <xsd:import namespace="6b01692f-8f45-4310-abfd-accd438f234f"/>
@@ -3576,6 +5602,15 @@
 </ct:contentTypeSchema>
 </file>
 
+<file path=customXml/item3.xml><?xml version="1.0" encoding="utf-8"?>
+<?mso-contentType ?>
+<FormTemplates xmlns="http://schemas.microsoft.com/sharepoint/v3/contenttype/forms">
+  <Display>DocumentLibraryForm</Display>
+  <Edit>DocumentLibraryForm</Edit>
+  <New>DocumentLibraryForm</New>
+</FormTemplates>
+</file>
+
 <file path=customXml/itemProps1.xml><?xml version="1.0" encoding="utf-8"?>
 <ds:datastoreItem xmlns:ds="http://schemas.openxmlformats.org/officeDocument/2006/customXml" ds:itemID="{665827D5-5A12-48FB-BA20-1E7CB9BA5BA1}">
   <ds:schemaRefs>
@@ -3594,14 +5629,6 @@
 </file>
 
 <file path=customXml/itemProps2.xml><?xml version="1.0" encoding="utf-8"?>
-<ds:datastoreItem xmlns:ds="http://schemas.openxmlformats.org/officeDocument/2006/customXml" ds:itemID="{EE540D17-DFE7-4DA1-AB7C-9204237EF006}">
-  <ds:schemaRefs>
-    <ds:schemaRef ds:uri="http://schemas.microsoft.com/sharepoint/v3/contenttype/forms"/>
-  </ds:schemaRefs>
-</ds:datastoreItem>
-</file>
-
-<file path=customXml/itemProps3.xml><?xml version="1.0" encoding="utf-8"?>
 <ds:datastoreItem xmlns:ds="http://schemas.openxmlformats.org/officeDocument/2006/customXml" ds:itemID="{E5A48691-3E40-4B9C-9CEF-B13064CE8A2A}">
   <ds:schemaRefs>
     <ds:schemaRef ds:uri="http://schemas.microsoft.com/office/2006/metadata/contentType"/>
@@ -3618,4 +5645,12 @@
     <ds:schemaRef ds:uri="http://schemas.microsoft.com/internal/obd"/>
   </ds:schemaRefs>
 </ds:datastoreItem>
+</file>
+
+<file path=customXml/itemProps3.xml><?xml version="1.0" encoding="utf-8"?>
+<ds:datastoreItem xmlns:ds="http://schemas.openxmlformats.org/officeDocument/2006/customXml" ds:itemID="{EE540D17-DFE7-4DA1-AB7C-9204237EF006}">
+  <ds:schemaRefs>
+    <ds:schemaRef ds:uri="http://schemas.microsoft.com/sharepoint/v3/contenttype/forms"/>
+  </ds:schemaRefs>
+</ds:datastoreItem>
 </file>
</xml_diff>

<commit_message>
Added note on time series
</commit_message>
<xml_diff>
--- a/lesson-outliers.pptx
+++ b/lesson-outliers.pptx
@@ -5,10 +5,10 @@
     <p:sldMasterId id="2147483648" r:id="rId4"/>
   </p:sldMasterIdLst>
   <p:notesMasterIdLst>
-    <p:notesMasterId r:id="rId23"/>
+    <p:notesMasterId r:id="rId24"/>
   </p:notesMasterIdLst>
   <p:handoutMasterIdLst>
-    <p:handoutMasterId r:id="rId24"/>
+    <p:handoutMasterId r:id="rId25"/>
   </p:handoutMasterIdLst>
   <p:sldIdLst>
     <p:sldId id="257" r:id="rId5"/>
@@ -19,16 +19,17 @@
     <p:sldId id="283" r:id="rId10"/>
     <p:sldId id="284" r:id="rId11"/>
     <p:sldId id="287" r:id="rId12"/>
-    <p:sldId id="288" r:id="rId13"/>
-    <p:sldId id="289" r:id="rId14"/>
-    <p:sldId id="285" r:id="rId15"/>
-    <p:sldId id="290" r:id="rId16"/>
-    <p:sldId id="294" r:id="rId17"/>
-    <p:sldId id="295" r:id="rId18"/>
-    <p:sldId id="296" r:id="rId19"/>
-    <p:sldId id="292" r:id="rId20"/>
-    <p:sldId id="291" r:id="rId21"/>
-    <p:sldId id="293" r:id="rId22"/>
+    <p:sldId id="297" r:id="rId13"/>
+    <p:sldId id="288" r:id="rId14"/>
+    <p:sldId id="289" r:id="rId15"/>
+    <p:sldId id="285" r:id="rId16"/>
+    <p:sldId id="290" r:id="rId17"/>
+    <p:sldId id="294" r:id="rId18"/>
+    <p:sldId id="295" r:id="rId19"/>
+    <p:sldId id="296" r:id="rId20"/>
+    <p:sldId id="292" r:id="rId21"/>
+    <p:sldId id="291" r:id="rId22"/>
+    <p:sldId id="293" r:id="rId23"/>
   </p:sldIdLst>
   <p:sldSz cx="9144000" cy="6858000" type="screen4x3"/>
   <p:notesSz cx="6858000" cy="9144000"/>
@@ -2264,6 +2265,127 @@
         <p:cNvPr id="1" name="">
           <a:extLst>
             <a:ext uri="{FF2B5EF4-FFF2-40B4-BE49-F238E27FC236}">
+              <a16:creationId xmlns:a16="http://schemas.microsoft.com/office/drawing/2014/main" id="{32A2BE81-5DE4-5887-6797-CC7E9BADB88F}"/>
+            </a:ext>
+          </a:extLst>
+        </p:cNvPr>
+        <p:cNvGrpSpPr/>
+        <p:nvPr/>
+      </p:nvGrpSpPr>
+      <p:grpSpPr>
+        <a:xfrm>
+          <a:off x="0" y="0"/>
+          <a:ext cx="0" cy="0"/>
+          <a:chOff x="0" y="0"/>
+          <a:chExt cx="0" cy="0"/>
+        </a:xfrm>
+      </p:grpSpPr>
+      <p:sp>
+        <p:nvSpPr>
+          <p:cNvPr id="4" name="Titel 3">
+            <a:extLst>
+              <a:ext uri="{FF2B5EF4-FFF2-40B4-BE49-F238E27FC236}">
+                <a16:creationId xmlns:a16="http://schemas.microsoft.com/office/drawing/2014/main" id="{B21FE48D-E536-FD45-7385-A30C55440375}"/>
+              </a:ext>
+            </a:extLst>
+          </p:cNvPr>
+          <p:cNvSpPr>
+            <a:spLocks noGrp="1"/>
+          </p:cNvSpPr>
+          <p:nvPr>
+            <p:ph type="title"/>
+          </p:nvPr>
+        </p:nvSpPr>
+        <p:spPr/>
+        <p:txBody>
+          <a:bodyPr/>
+          <a:lstStyle/>
+          <a:p>
+            <a:r>
+              <a:rPr lang="en-US" noProof="0" dirty="0"/>
+              <a:t>WORKSHOP</a:t>
+            </a:r>
+          </a:p>
+        </p:txBody>
+      </p:sp>
+      <p:sp>
+        <p:nvSpPr>
+          <p:cNvPr id="5" name="Tijdelijke aanduiding voor inhoud 4">
+            <a:extLst>
+              <a:ext uri="{FF2B5EF4-FFF2-40B4-BE49-F238E27FC236}">
+                <a16:creationId xmlns:a16="http://schemas.microsoft.com/office/drawing/2014/main" id="{B2C78952-D571-EEB6-84D6-093187344CF0}"/>
+              </a:ext>
+            </a:extLst>
+          </p:cNvPr>
+          <p:cNvSpPr>
+            <a:spLocks noGrp="1"/>
+          </p:cNvSpPr>
+          <p:nvPr>
+            <p:ph type="body" sz="quarter" idx="10"/>
+          </p:nvPr>
+        </p:nvSpPr>
+        <p:spPr/>
+        <p:txBody>
+          <a:bodyPr/>
+          <a:lstStyle/>
+          <a:p>
+            <a:pPr marL="457200" indent="-457200">
+              <a:lnSpc>
+                <a:spcPct val="100000"/>
+              </a:lnSpc>
+              <a:buFont typeface="+mj-lt"/>
+              <a:buAutoNum type="arabicPeriod"/>
+            </a:pPr>
+            <a:r>
+              <a:rPr lang="en-US" dirty="0"/>
+              <a:t>Detecting outliers and deciding what to do with them.</a:t>
+            </a:r>
+          </a:p>
+          <a:p>
+            <a:pPr marL="457200" indent="-457200">
+              <a:lnSpc>
+                <a:spcPct val="100000"/>
+              </a:lnSpc>
+              <a:buFont typeface="+mj-lt"/>
+              <a:buAutoNum type="arabicPeriod"/>
+            </a:pPr>
+            <a:r>
+              <a:rPr lang="en-US" dirty="0"/>
+              <a:t>Turning non-normal distributions into normal distributions</a:t>
+            </a:r>
+            <a:endParaRPr lang="en-US" noProof="0" dirty="0"/>
+          </a:p>
+        </p:txBody>
+      </p:sp>
+    </p:spTree>
+    <p:extLst>
+      <p:ext uri="{BB962C8B-B14F-4D97-AF65-F5344CB8AC3E}">
+        <p14:creationId xmlns:p14="http://schemas.microsoft.com/office/powerpoint/2010/main" val="2367867850"/>
+      </p:ext>
+    </p:extLst>
+  </p:cSld>
+  <p:clrMapOvr>
+    <a:masterClrMapping/>
+  </p:clrMapOvr>
+  <mc:AlternateContent xmlns:mc="http://schemas.openxmlformats.org/markup-compatibility/2006" xmlns:p14="http://schemas.microsoft.com/office/powerpoint/2010/main">
+    <mc:Choice Requires="p14">
+      <p:transition spd="slow" p14:dur="2000" advTm="4519"/>
+    </mc:Choice>
+    <mc:Fallback xmlns="">
+      <p:transition spd="slow" advTm="4519"/>
+    </mc:Fallback>
+  </mc:AlternateContent>
+</p:sld>
+</file>
+
+<file path=ppt/slides/slide11.xml><?xml version="1.0" encoding="utf-8"?>
+<p:sld xmlns:a="http://schemas.openxmlformats.org/drawingml/2006/main" xmlns:r="http://schemas.openxmlformats.org/officeDocument/2006/relationships" xmlns:p="http://schemas.openxmlformats.org/presentationml/2006/main">
+  <p:cSld>
+    <p:spTree>
+      <p:nvGrpSpPr>
+        <p:cNvPr id="1" name="">
+          <a:extLst>
+            <a:ext uri="{FF2B5EF4-FFF2-40B4-BE49-F238E27FC236}">
               <a16:creationId xmlns:a16="http://schemas.microsoft.com/office/drawing/2014/main" id="{0BB094FD-CC7E-DD9D-9810-A254CC769AA1}"/>
             </a:ext>
           </a:extLst>
@@ -2399,7 +2521,7 @@
 </p:sld>
 </file>
 
-<file path=ppt/slides/slide11.xml><?xml version="1.0" encoding="utf-8"?>
+<file path=ppt/slides/slide12.xml><?xml version="1.0" encoding="utf-8"?>
 <p:sld xmlns:a="http://schemas.openxmlformats.org/drawingml/2006/main" xmlns:r="http://schemas.openxmlformats.org/officeDocument/2006/relationships" xmlns:p="http://schemas.openxmlformats.org/presentationml/2006/main">
   <p:cSld>
     <p:spTree>
@@ -2561,7 +2683,7 @@
 </p:sld>
 </file>
 
-<file path=ppt/slides/slide12.xml><?xml version="1.0" encoding="utf-8"?>
+<file path=ppt/slides/slide13.xml><?xml version="1.0" encoding="utf-8"?>
 <p:sld xmlns:a="http://schemas.openxmlformats.org/drawingml/2006/main" xmlns:r="http://schemas.openxmlformats.org/officeDocument/2006/relationships" xmlns:p="http://schemas.openxmlformats.org/presentationml/2006/main">
   <p:cSld>
     <p:spTree>
@@ -2734,7 +2856,7 @@
 </p:sld>
 </file>
 
-<file path=ppt/slides/slide13.xml><?xml version="1.0" encoding="utf-8"?>
+<file path=ppt/slides/slide14.xml><?xml version="1.0" encoding="utf-8"?>
 <p:sld xmlns:a="http://schemas.openxmlformats.org/drawingml/2006/main" xmlns:r="http://schemas.openxmlformats.org/officeDocument/2006/relationships" xmlns:p="http://schemas.openxmlformats.org/presentationml/2006/main">
   <p:cSld>
     <p:spTree>
@@ -2896,7 +3018,7 @@
 </p:sld>
 </file>
 
-<file path=ppt/slides/slide14.xml><?xml version="1.0" encoding="utf-8"?>
+<file path=ppt/slides/slide15.xml><?xml version="1.0" encoding="utf-8"?>
 <p:sld xmlns:a="http://schemas.openxmlformats.org/drawingml/2006/main" xmlns:r="http://schemas.openxmlformats.org/officeDocument/2006/relationships" xmlns:p="http://schemas.openxmlformats.org/presentationml/2006/main">
   <p:cSld>
     <p:spTree>
@@ -3003,7 +3125,7 @@
 </p:sld>
 </file>
 
-<file path=ppt/slides/slide15.xml><?xml version="1.0" encoding="utf-8"?>
+<file path=ppt/slides/slide16.xml><?xml version="1.0" encoding="utf-8"?>
 <p:sld xmlns:a="http://schemas.openxmlformats.org/drawingml/2006/main" xmlns:r="http://schemas.openxmlformats.org/officeDocument/2006/relationships" xmlns:p="http://schemas.openxmlformats.org/presentationml/2006/main">
   <p:cSld>
     <p:spTree>
@@ -3259,7 +3381,7 @@
 </p:sld>
 </file>
 
-<file path=ppt/slides/slide16.xml><?xml version="1.0" encoding="utf-8"?>
+<file path=ppt/slides/slide17.xml><?xml version="1.0" encoding="utf-8"?>
 <p:sld xmlns:a="http://schemas.openxmlformats.org/drawingml/2006/main" xmlns:r="http://schemas.openxmlformats.org/officeDocument/2006/relationships" xmlns:p="http://schemas.openxmlformats.org/presentationml/2006/main">
   <p:cSld>
     <p:spTree>
@@ -3430,7 +3552,7 @@
 </p:sld>
 </file>
 
-<file path=ppt/slides/slide17.xml><?xml version="1.0" encoding="utf-8"?>
+<file path=ppt/slides/slide18.xml><?xml version="1.0" encoding="utf-8"?>
 <p:sld xmlns:a="http://schemas.openxmlformats.org/drawingml/2006/main" xmlns:r="http://schemas.openxmlformats.org/officeDocument/2006/relationships" xmlns:p="http://schemas.openxmlformats.org/presentationml/2006/main">
   <p:cSld>
     <p:spTree>
@@ -3537,7 +3659,7 @@
 </p:sld>
 </file>
 
-<file path=ppt/slides/slide18.xml><?xml version="1.0" encoding="utf-8"?>
+<file path=ppt/slides/slide19.xml><?xml version="1.0" encoding="utf-8"?>
 <p:sld xmlns:a="http://schemas.openxmlformats.org/drawingml/2006/main" xmlns:r="http://schemas.openxmlformats.org/officeDocument/2006/relationships" xmlns:p="http://schemas.openxmlformats.org/presentationml/2006/main">
   <p:cSld>
     <p:spTree>
@@ -5463,13 +5585,7 @@
   <p:cSld>
     <p:spTree>
       <p:nvGrpSpPr>
-        <p:cNvPr id="1" name="">
-          <a:extLst>
-            <a:ext uri="{FF2B5EF4-FFF2-40B4-BE49-F238E27FC236}">
-              <a16:creationId xmlns:a16="http://schemas.microsoft.com/office/drawing/2014/main" id="{32A2BE81-5DE4-5887-6797-CC7E9BADB88F}"/>
-            </a:ext>
-          </a:extLst>
-        </p:cNvPr>
+        <p:cNvPr id="1" name=""/>
         <p:cNvGrpSpPr/>
         <p:nvPr/>
       </p:nvGrpSpPr>
@@ -5483,10 +5599,60 @@
       </p:grpSpPr>
       <p:sp>
         <p:nvSpPr>
-          <p:cNvPr id="4" name="Titel 3">
+          <p:cNvPr id="2" name="Tijdelijke aanduiding voor tekst 1">
             <a:extLst>
               <a:ext uri="{FF2B5EF4-FFF2-40B4-BE49-F238E27FC236}">
-                <a16:creationId xmlns:a16="http://schemas.microsoft.com/office/drawing/2014/main" id="{B21FE48D-E536-FD45-7385-A30C55440375}"/>
+                <a16:creationId xmlns:a16="http://schemas.microsoft.com/office/drawing/2014/main" id="{19524FB3-2668-C864-68B4-7CFE47C1B39F}"/>
+              </a:ext>
+            </a:extLst>
+          </p:cNvPr>
+          <p:cNvSpPr>
+            <a:spLocks noGrp="1"/>
+          </p:cNvSpPr>
+          <p:nvPr>
+            <p:ph type="body" sz="quarter" idx="10"/>
+          </p:nvPr>
+        </p:nvSpPr>
+        <p:spPr/>
+        <p:txBody>
+          <a:bodyPr/>
+          <a:lstStyle/>
+          <a:p>
+            <a:pPr marL="342900" indent="-342900">
+              <a:buFont typeface="Arial" panose="020B0604020202020204" pitchFamily="34" charset="0"/>
+              <a:buChar char="•"/>
+            </a:pPr>
+            <a:r>
+              <a:rPr lang="en-US" dirty="0"/>
+              <a:t>Time series can have outliers, too.</a:t>
+            </a:r>
+          </a:p>
+          <a:p>
+            <a:pPr marL="342900" indent="-342900">
+              <a:buFont typeface="Arial" panose="020B0604020202020204" pitchFamily="34" charset="0"/>
+              <a:buChar char="•"/>
+            </a:pPr>
+            <a:r>
+              <a:rPr lang="en-US" dirty="0"/>
+              <a:t>BUT: make sure your time series </a:t>
+            </a:r>
+            <a:r>
+              <a:rPr lang="en-US"/>
+              <a:t>is stationary </a:t>
+            </a:r>
+            <a:r>
+              <a:rPr lang="en-US" dirty="0"/>
+              <a:t>before you start investigating them (why?).</a:t>
+            </a:r>
+          </a:p>
+        </p:txBody>
+      </p:sp>
+      <p:sp>
+        <p:nvSpPr>
+          <p:cNvPr id="3" name="Titel 2">
+            <a:extLst>
+              <a:ext uri="{FF2B5EF4-FFF2-40B4-BE49-F238E27FC236}">
+                <a16:creationId xmlns:a16="http://schemas.microsoft.com/office/drawing/2014/main" id="{C6BB9FDA-4D8B-CC91-DDCE-72E237B25973}"/>
               </a:ext>
             </a:extLst>
           </p:cNvPr>
@@ -5503,79 +5669,22 @@
           <a:lstStyle/>
           <a:p>
             <a:r>
-              <a:rPr lang="en-US" noProof="0" dirty="0"/>
-              <a:t>WORKSHOP</a:t>
-            </a:r>
-          </a:p>
-        </p:txBody>
-      </p:sp>
-      <p:sp>
-        <p:nvSpPr>
-          <p:cNvPr id="5" name="Tijdelijke aanduiding voor inhoud 4">
-            <a:extLst>
-              <a:ext uri="{FF2B5EF4-FFF2-40B4-BE49-F238E27FC236}">
-                <a16:creationId xmlns:a16="http://schemas.microsoft.com/office/drawing/2014/main" id="{B2C78952-D571-EEB6-84D6-093187344CF0}"/>
-              </a:ext>
-            </a:extLst>
-          </p:cNvPr>
-          <p:cNvSpPr>
-            <a:spLocks noGrp="1"/>
-          </p:cNvSpPr>
-          <p:nvPr>
-            <p:ph type="body" sz="quarter" idx="10"/>
-          </p:nvPr>
-        </p:nvSpPr>
-        <p:spPr/>
-        <p:txBody>
-          <a:bodyPr/>
-          <a:lstStyle/>
-          <a:p>
-            <a:pPr marL="457200" indent="-457200">
-              <a:lnSpc>
-                <a:spcPct val="100000"/>
-              </a:lnSpc>
-              <a:buFont typeface="+mj-lt"/>
-              <a:buAutoNum type="arabicPeriod"/>
-            </a:pPr>
-            <a:r>
               <a:rPr lang="en-US" dirty="0"/>
-              <a:t>Detecting outliers and deciding what to do with them.</a:t>
-            </a:r>
-          </a:p>
-          <a:p>
-            <a:pPr marL="457200" indent="-457200">
-              <a:lnSpc>
-                <a:spcPct val="100000"/>
-              </a:lnSpc>
-              <a:buFont typeface="+mj-lt"/>
-              <a:buAutoNum type="arabicPeriod"/>
-            </a:pPr>
-            <a:r>
-              <a:rPr lang="en-US" dirty="0"/>
-              <a:t>Turning non-normal distributions into normal distributions</a:t>
-            </a:r>
-            <a:endParaRPr lang="en-US" noProof="0" dirty="0"/>
+              <a:t>OUTLIERS (extra): TIME SERIES</a:t>
+            </a:r>
           </a:p>
         </p:txBody>
       </p:sp>
     </p:spTree>
     <p:extLst>
       <p:ext uri="{BB962C8B-B14F-4D97-AF65-F5344CB8AC3E}">
-        <p14:creationId xmlns:p14="http://schemas.microsoft.com/office/powerpoint/2010/main" val="2367867850"/>
+        <p14:creationId xmlns:p14="http://schemas.microsoft.com/office/powerpoint/2010/main" val="1082047118"/>
       </p:ext>
     </p:extLst>
   </p:cSld>
   <p:clrMapOvr>
     <a:masterClrMapping/>
   </p:clrMapOvr>
-  <mc:AlternateContent xmlns:mc="http://schemas.openxmlformats.org/markup-compatibility/2006" xmlns:p14="http://schemas.microsoft.com/office/powerpoint/2010/main">
-    <mc:Choice Requires="p14">
-      <p:transition spd="slow" p14:dur="2000" advTm="4519"/>
-    </mc:Choice>
-    <mc:Fallback xmlns="">
-      <p:transition spd="slow" advTm="4519"/>
-    </mc:Fallback>
-  </mc:AlternateContent>
 </p:sld>
 </file>
 

</xml_diff>